<commit_message>
Correction + enrichissement set de carte
</commit_message>
<xml_diff>
--- a/Docs/CartesPerm.pptx
+++ b/Docs/CartesPerm.pptx
@@ -5,21 +5,30 @@
     <p:sldMasterId id="2147483648" r:id="rId1"/>
   </p:sldMasterIdLst>
   <p:handoutMasterIdLst>
-    <p:handoutMasterId r:id="rId11"/>
+    <p:handoutMasterId r:id="rId20"/>
   </p:handoutMasterIdLst>
   <p:sldIdLst>
-    <p:sldId id="262" r:id="rId2"/>
-    <p:sldId id="296" r:id="rId3"/>
-    <p:sldId id="263" r:id="rId4"/>
+    <p:sldId id="296" r:id="rId2"/>
+    <p:sldId id="308" r:id="rId3"/>
+    <p:sldId id="298" r:id="rId4"/>
     <p:sldId id="297" r:id="rId5"/>
     <p:sldId id="264" r:id="rId6"/>
-    <p:sldId id="265" r:id="rId7"/>
-    <p:sldId id="273" r:id="rId8"/>
-    <p:sldId id="295" r:id="rId9"/>
-    <p:sldId id="274" r:id="rId10"/>
+    <p:sldId id="303" r:id="rId7"/>
+    <p:sldId id="265" r:id="rId8"/>
+    <p:sldId id="304" r:id="rId9"/>
+    <p:sldId id="300" r:id="rId10"/>
+    <p:sldId id="273" r:id="rId11"/>
+    <p:sldId id="295" r:id="rId12"/>
+    <p:sldId id="274" r:id="rId13"/>
+    <p:sldId id="305" r:id="rId14"/>
+    <p:sldId id="299" r:id="rId15"/>
+    <p:sldId id="306" r:id="rId16"/>
+    <p:sldId id="301" r:id="rId17"/>
+    <p:sldId id="307" r:id="rId18"/>
+    <p:sldId id="302" r:id="rId19"/>
   </p:sldIdLst>
   <p:sldSz cx="9144000" cy="6858000" type="screen4x3"/>
-  <p:notesSz cx="6858000" cy="9144000"/>
+  <p:notesSz cx="9144000" cy="6858000"/>
   <p:defaultTextStyle>
     <a:defPPr>
       <a:defRPr lang="fr-FR"/>
@@ -153,7 +162,7 @@
         <p:spPr>
           <a:xfrm>
             <a:off x="0" y="0"/>
-            <a:ext cx="2971800" cy="457200"/>
+            <a:ext cx="3962400" cy="342900"/>
           </a:xfrm>
           <a:prstGeom prst="rect">
             <a:avLst/>
@@ -183,8 +192,8 @@
         </p:nvSpPr>
         <p:spPr>
           <a:xfrm>
-            <a:off x="3884613" y="0"/>
-            <a:ext cx="2971800" cy="457200"/>
+            <a:off x="5179484" y="0"/>
+            <a:ext cx="3962400" cy="342900"/>
           </a:xfrm>
           <a:prstGeom prst="rect">
             <a:avLst/>
@@ -200,7 +209,7 @@
           <a:p>
             <a:fld id="{8F6BF74C-C825-46E6-A94A-4DDCA47B6E5E}" type="datetimeFigureOut">
               <a:rPr lang="fr-FR" smtClean="0"/>
-              <a:t>03/08/2015</a:t>
+              <a:t>12/08/2015</a:t>
             </a:fld>
             <a:endParaRPr lang="fr-FR"/>
           </a:p>
@@ -218,8 +227,8 @@
         </p:nvSpPr>
         <p:spPr>
           <a:xfrm>
-            <a:off x="0" y="8685213"/>
-            <a:ext cx="2971800" cy="457200"/>
+            <a:off x="0" y="6513910"/>
+            <a:ext cx="3962400" cy="342900"/>
           </a:xfrm>
           <a:prstGeom prst="rect">
             <a:avLst/>
@@ -249,8 +258,8 @@
         </p:nvSpPr>
         <p:spPr>
           <a:xfrm>
-            <a:off x="3884613" y="8685213"/>
-            <a:ext cx="2971800" cy="457200"/>
+            <a:off x="5179484" y="6513910"/>
+            <a:ext cx="3962400" cy="342900"/>
           </a:xfrm>
           <a:prstGeom prst="rect">
             <a:avLst/>
@@ -464,7 +473,7 @@
           <a:p>
             <a:fld id="{AA309A6D-C09C-4548-B29A-6CF363A7E532}" type="datetimeFigureOut">
               <a:rPr lang="fr-FR" smtClean="0"/>
-              <a:t>03/08/2015</a:t>
+              <a:t>12/08/2015</a:t>
             </a:fld>
             <a:endParaRPr lang="fr-BE"/>
           </a:p>
@@ -629,7 +638,7 @@
           <a:p>
             <a:fld id="{AA309A6D-C09C-4548-B29A-6CF363A7E532}" type="datetimeFigureOut">
               <a:rPr lang="fr-FR" smtClean="0"/>
-              <a:t>03/08/2015</a:t>
+              <a:t>12/08/2015</a:t>
             </a:fld>
             <a:endParaRPr lang="fr-BE"/>
           </a:p>
@@ -804,7 +813,7 @@
           <a:p>
             <a:fld id="{AA309A6D-C09C-4548-B29A-6CF363A7E532}" type="datetimeFigureOut">
               <a:rPr lang="fr-FR" smtClean="0"/>
-              <a:t>03/08/2015</a:t>
+              <a:t>12/08/2015</a:t>
             </a:fld>
             <a:endParaRPr lang="fr-BE"/>
           </a:p>
@@ -969,7 +978,7 @@
           <a:p>
             <a:fld id="{AA309A6D-C09C-4548-B29A-6CF363A7E532}" type="datetimeFigureOut">
               <a:rPr lang="fr-FR" smtClean="0"/>
-              <a:t>03/08/2015</a:t>
+              <a:t>12/08/2015</a:t>
             </a:fld>
             <a:endParaRPr lang="fr-BE"/>
           </a:p>
@@ -1210,7 +1219,7 @@
           <a:p>
             <a:fld id="{AA309A6D-C09C-4548-B29A-6CF363A7E532}" type="datetimeFigureOut">
               <a:rPr lang="fr-FR" smtClean="0"/>
-              <a:t>03/08/2015</a:t>
+              <a:t>12/08/2015</a:t>
             </a:fld>
             <a:endParaRPr lang="fr-BE"/>
           </a:p>
@@ -1493,7 +1502,7 @@
           <a:p>
             <a:fld id="{AA309A6D-C09C-4548-B29A-6CF363A7E532}" type="datetimeFigureOut">
               <a:rPr lang="fr-FR" smtClean="0"/>
-              <a:t>03/08/2015</a:t>
+              <a:t>12/08/2015</a:t>
             </a:fld>
             <a:endParaRPr lang="fr-BE"/>
           </a:p>
@@ -1910,7 +1919,7 @@
           <a:p>
             <a:fld id="{AA309A6D-C09C-4548-B29A-6CF363A7E532}" type="datetimeFigureOut">
               <a:rPr lang="fr-FR" smtClean="0"/>
-              <a:t>03/08/2015</a:t>
+              <a:t>12/08/2015</a:t>
             </a:fld>
             <a:endParaRPr lang="fr-BE"/>
           </a:p>
@@ -2023,7 +2032,7 @@
           <a:p>
             <a:fld id="{AA309A6D-C09C-4548-B29A-6CF363A7E532}" type="datetimeFigureOut">
               <a:rPr lang="fr-FR" smtClean="0"/>
-              <a:t>03/08/2015</a:t>
+              <a:t>12/08/2015</a:t>
             </a:fld>
             <a:endParaRPr lang="fr-BE"/>
           </a:p>
@@ -2113,7 +2122,7 @@
           <a:p>
             <a:fld id="{AA309A6D-C09C-4548-B29A-6CF363A7E532}" type="datetimeFigureOut">
               <a:rPr lang="fr-FR" smtClean="0"/>
-              <a:t>03/08/2015</a:t>
+              <a:t>12/08/2015</a:t>
             </a:fld>
             <a:endParaRPr lang="fr-BE"/>
           </a:p>
@@ -2385,7 +2394,7 @@
           <a:p>
             <a:fld id="{AA309A6D-C09C-4548-B29A-6CF363A7E532}" type="datetimeFigureOut">
               <a:rPr lang="fr-FR" smtClean="0"/>
-              <a:t>03/08/2015</a:t>
+              <a:t>12/08/2015</a:t>
             </a:fld>
             <a:endParaRPr lang="fr-BE"/>
           </a:p>
@@ -2633,7 +2642,7 @@
           <a:p>
             <a:fld id="{AA309A6D-C09C-4548-B29A-6CF363A7E532}" type="datetimeFigureOut">
               <a:rPr lang="fr-FR" smtClean="0"/>
-              <a:t>03/08/2015</a:t>
+              <a:t>12/08/2015</a:t>
             </a:fld>
             <a:endParaRPr lang="fr-BE"/>
           </a:p>
@@ -2841,7 +2850,7 @@
           <a:p>
             <a:fld id="{AA309A6D-C09C-4548-B29A-6CF363A7E532}" type="datetimeFigureOut">
               <a:rPr lang="fr-FR" smtClean="0"/>
-              <a:t>03/08/2015</a:t>
+              <a:t>12/08/2015</a:t>
             </a:fld>
             <a:endParaRPr lang="fr-BE"/>
           </a:p>
@@ -3518,7 +3527,3108 @@
     </p:spTree>
     <p:extLst>
       <p:ext uri="{BB962C8B-B14F-4D97-AF65-F5344CB8AC3E}">
-        <p14:creationId xmlns:p14="http://schemas.microsoft.com/office/powerpoint/2010/main" val="3118508753"/>
+        <p14:creationId xmlns:p14="http://schemas.microsoft.com/office/powerpoint/2010/main" val="3108208375"/>
+      </p:ext>
+    </p:extLst>
+  </p:cSld>
+  <p:clrMapOvr>
+    <a:masterClrMapping/>
+  </p:clrMapOvr>
+  <p:timing>
+    <p:tnLst>
+      <p:par>
+        <p:cTn id="1" dur="indefinite" restart="never" nodeType="tmRoot"/>
+      </p:par>
+    </p:tnLst>
+  </p:timing>
+</p:sld>
+</file>
+
+<file path=ppt/slides/slide10.xml><?xml version="1.0" encoding="utf-8"?>
+<p:sld xmlns:a="http://schemas.openxmlformats.org/drawingml/2006/main" xmlns:r="http://schemas.openxmlformats.org/officeDocument/2006/relationships" xmlns:p="http://schemas.openxmlformats.org/presentationml/2006/main">
+  <p:cSld>
+    <p:spTree>
+      <p:nvGrpSpPr>
+        <p:cNvPr id="1" name=""/>
+        <p:cNvGrpSpPr/>
+        <p:nvPr/>
+      </p:nvGrpSpPr>
+      <p:grpSpPr>
+        <a:xfrm>
+          <a:off x="0" y="0"/>
+          <a:ext cx="0" cy="0"/>
+          <a:chOff x="0" y="0"/>
+          <a:chExt cx="0" cy="0"/>
+        </a:xfrm>
+      </p:grpSpPr>
+      <p:sp>
+        <p:nvSpPr>
+          <p:cNvPr id="6" name="Rectangle 5"/>
+          <p:cNvSpPr/>
+          <p:nvPr/>
+        </p:nvSpPr>
+        <p:spPr>
+          <a:xfrm>
+            <a:off x="0" y="0"/>
+            <a:ext cx="9144000" cy="6858000"/>
+          </a:xfrm>
+          <a:prstGeom prst="rect">
+            <a:avLst/>
+          </a:prstGeom>
+          <a:solidFill>
+            <a:srgbClr val="FFC000">
+              <a:alpha val="0"/>
+            </a:srgbClr>
+          </a:solidFill>
+          <a:ln w="101600">
+            <a:solidFill>
+              <a:schemeClr val="tx1"/>
+            </a:solidFill>
+          </a:ln>
+        </p:spPr>
+        <p:style>
+          <a:lnRef idx="2">
+            <a:schemeClr val="accent1">
+              <a:shade val="50000"/>
+            </a:schemeClr>
+          </a:lnRef>
+          <a:fillRef idx="1">
+            <a:schemeClr val="accent1"/>
+          </a:fillRef>
+          <a:effectRef idx="0">
+            <a:schemeClr val="accent1"/>
+          </a:effectRef>
+          <a:fontRef idx="minor">
+            <a:schemeClr val="lt1"/>
+          </a:fontRef>
+        </p:style>
+        <p:txBody>
+          <a:bodyPr rtlCol="0" anchor="ctr"/>
+          <a:lstStyle/>
+          <a:p>
+            <a:pPr algn="ctr"/>
+            <a:endParaRPr lang="fr-FR">
+              <a:solidFill>
+                <a:srgbClr val="FFC000"/>
+              </a:solidFill>
+            </a:endParaRPr>
+          </a:p>
+        </p:txBody>
+      </p:sp>
+      <p:sp>
+        <p:nvSpPr>
+          <p:cNvPr id="2" name="Titre 1"/>
+          <p:cNvSpPr>
+            <a:spLocks noGrp="1"/>
+          </p:cNvSpPr>
+          <p:nvPr>
+            <p:ph type="ctrTitle"/>
+          </p:nvPr>
+        </p:nvSpPr>
+        <p:spPr>
+          <a:xfrm>
+            <a:off x="323528" y="332656"/>
+            <a:ext cx="2304256" cy="936104"/>
+          </a:xfrm>
+        </p:spPr>
+        <p:txBody>
+          <a:bodyPr>
+            <a:noAutofit/>
+          </a:bodyPr>
+          <a:lstStyle/>
+          <a:p>
+            <a:r>
+              <a:rPr lang="fr-FR" sz="7200" dirty="0" smtClean="0"/>
+              <a:t>-</a:t>
+            </a:r>
+            <a:endParaRPr lang="fr-FR" sz="7200" dirty="0"/>
+          </a:p>
+        </p:txBody>
+      </p:sp>
+      <p:sp>
+        <p:nvSpPr>
+          <p:cNvPr id="3" name="Sous-titre 2"/>
+          <p:cNvSpPr>
+            <a:spLocks noGrp="1"/>
+          </p:cNvSpPr>
+          <p:nvPr>
+            <p:ph type="subTitle" idx="1"/>
+          </p:nvPr>
+        </p:nvSpPr>
+        <p:spPr>
+          <a:xfrm>
+            <a:off x="1907704" y="2744924"/>
+            <a:ext cx="4856584" cy="1368152"/>
+          </a:xfrm>
+        </p:spPr>
+        <p:txBody>
+          <a:bodyPr vert="horz" lIns="91440" tIns="45720" rIns="91440" bIns="45720" rtlCol="0" anchor="ctr">
+            <a:noAutofit/>
+          </a:bodyPr>
+          <a:lstStyle/>
+          <a:p>
+            <a:pPr>
+              <a:spcBef>
+                <a:spcPct val="0"/>
+              </a:spcBef>
+            </a:pPr>
+            <a:r>
+              <a:rPr lang="fr-FR" sz="7200" dirty="0" err="1">
+                <a:solidFill>
+                  <a:schemeClr val="tx1"/>
+                </a:solidFill>
+                <a:latin typeface="+mj-lt"/>
+                <a:ea typeface="+mj-ea"/>
+                <a:cs typeface="+mj-cs"/>
+              </a:rPr>
+              <a:t>Évax</a:t>
+            </a:r>
+            <a:r>
+              <a:rPr lang="fr-FR" sz="7200" dirty="0">
+                <a:solidFill>
+                  <a:schemeClr val="tx1"/>
+                </a:solidFill>
+                <a:latin typeface="+mj-lt"/>
+                <a:ea typeface="+mj-ea"/>
+                <a:cs typeface="+mj-cs"/>
+              </a:rPr>
+              <a:t> pygmée</a:t>
+            </a:r>
+          </a:p>
+        </p:txBody>
+      </p:sp>
+      <p:sp>
+        <p:nvSpPr>
+          <p:cNvPr id="4" name="Titre 1"/>
+          <p:cNvSpPr txBox="1">
+            <a:spLocks/>
+          </p:cNvSpPr>
+          <p:nvPr/>
+        </p:nvSpPr>
+        <p:spPr>
+          <a:xfrm>
+            <a:off x="7452320" y="260648"/>
+            <a:ext cx="1368152" cy="648072"/>
+          </a:xfrm>
+          <a:prstGeom prst="rect">
+            <a:avLst/>
+          </a:prstGeom>
+        </p:spPr>
+        <p:txBody>
+          <a:bodyPr vert="horz" lIns="91440" tIns="45720" rIns="91440" bIns="45720" rtlCol="0" anchor="ctr">
+            <a:noAutofit/>
+          </a:bodyPr>
+          <a:lstStyle>
+            <a:lvl1pPr algn="ctr">
+              <a:spcBef>
+                <a:spcPct val="0"/>
+              </a:spcBef>
+              <a:buNone/>
+              <a:defRPr sz="7200">
+                <a:latin typeface="+mj-lt"/>
+                <a:ea typeface="+mj-ea"/>
+                <a:cs typeface="+mj-cs"/>
+              </a:defRPr>
+            </a:lvl1pPr>
+          </a:lstStyle>
+          <a:p>
+            <a:endParaRPr lang="fr-FR" dirty="0"/>
+          </a:p>
+        </p:txBody>
+      </p:sp>
+      <p:sp>
+        <p:nvSpPr>
+          <p:cNvPr id="5" name="Titre 1"/>
+          <p:cNvSpPr txBox="1">
+            <a:spLocks/>
+          </p:cNvSpPr>
+          <p:nvPr/>
+        </p:nvSpPr>
+        <p:spPr>
+          <a:xfrm>
+            <a:off x="467544" y="5805264"/>
+            <a:ext cx="2103218" cy="648072"/>
+          </a:xfrm>
+          <a:prstGeom prst="rect">
+            <a:avLst/>
+          </a:prstGeom>
+        </p:spPr>
+        <p:txBody>
+          <a:bodyPr vert="horz" lIns="91440" tIns="45720" rIns="91440" bIns="45720" rtlCol="0" anchor="ctr">
+            <a:noAutofit/>
+          </a:bodyPr>
+          <a:lstStyle>
+            <a:defPPr>
+              <a:defRPr lang="fr-FR"/>
+            </a:defPPr>
+            <a:lvl1pPr algn="ctr">
+              <a:spcBef>
+                <a:spcPct val="0"/>
+              </a:spcBef>
+              <a:buNone/>
+              <a:defRPr sz="7200">
+                <a:latin typeface="+mj-lt"/>
+                <a:ea typeface="+mj-ea"/>
+                <a:cs typeface="+mj-cs"/>
+              </a:defRPr>
+            </a:lvl1pPr>
+          </a:lstStyle>
+          <a:p>
+            <a:r>
+              <a:rPr lang="fr-FR" dirty="0" err="1"/>
+              <a:t>Niv</a:t>
+            </a:r>
+            <a:r>
+              <a:rPr lang="fr-FR" dirty="0"/>
+              <a:t> </a:t>
+            </a:r>
+            <a:r>
+              <a:rPr lang="fr-FR" dirty="0" smtClean="0"/>
+              <a:t>3</a:t>
+            </a:r>
+            <a:endParaRPr lang="fr-FR" dirty="0"/>
+          </a:p>
+        </p:txBody>
+      </p:sp>
+      <p:sp>
+        <p:nvSpPr>
+          <p:cNvPr id="7" name="Titre 1"/>
+          <p:cNvSpPr txBox="1">
+            <a:spLocks/>
+          </p:cNvSpPr>
+          <p:nvPr/>
+        </p:nvSpPr>
+        <p:spPr>
+          <a:xfrm>
+            <a:off x="5076056" y="4905164"/>
+            <a:ext cx="3528392" cy="1800200"/>
+          </a:xfrm>
+          <a:prstGeom prst="rect">
+            <a:avLst/>
+          </a:prstGeom>
+        </p:spPr>
+        <p:txBody>
+          <a:bodyPr vert="horz" lIns="91440" tIns="45720" rIns="91440" bIns="45720" rtlCol="0" anchor="ctr">
+            <a:noAutofit/>
+          </a:bodyPr>
+          <a:lstStyle>
+            <a:defPPr>
+              <a:defRPr lang="fr-FR"/>
+            </a:defPPr>
+            <a:lvl1pPr algn="ctr">
+              <a:spcBef>
+                <a:spcPct val="0"/>
+              </a:spcBef>
+              <a:buNone/>
+              <a:defRPr sz="7200">
+                <a:latin typeface="+mj-lt"/>
+                <a:ea typeface="+mj-ea"/>
+                <a:cs typeface="+mj-cs"/>
+              </a:defRPr>
+            </a:lvl1pPr>
+          </a:lstStyle>
+          <a:p>
+            <a:r>
+              <a:rPr lang="fr-FR" dirty="0"/>
+              <a:t> -1 At </a:t>
+            </a:r>
+          </a:p>
+        </p:txBody>
+      </p:sp>
+      <p:sp>
+        <p:nvSpPr>
+          <p:cNvPr id="8" name="Titre 1"/>
+          <p:cNvSpPr txBox="1">
+            <a:spLocks/>
+          </p:cNvSpPr>
+          <p:nvPr/>
+        </p:nvSpPr>
+        <p:spPr>
+          <a:xfrm>
+            <a:off x="7604720" y="413048"/>
+            <a:ext cx="1368152" cy="648072"/>
+          </a:xfrm>
+          <a:prstGeom prst="rect">
+            <a:avLst/>
+          </a:prstGeom>
+        </p:spPr>
+        <p:txBody>
+          <a:bodyPr vert="horz" lIns="91440" tIns="45720" rIns="91440" bIns="45720" rtlCol="0" anchor="ctr">
+            <a:noAutofit/>
+          </a:bodyPr>
+          <a:lstStyle>
+            <a:lvl1pPr algn="ctr">
+              <a:spcBef>
+                <a:spcPct val="0"/>
+              </a:spcBef>
+              <a:buNone/>
+              <a:defRPr sz="7200">
+                <a:latin typeface="+mj-lt"/>
+                <a:ea typeface="+mj-ea"/>
+                <a:cs typeface="+mj-cs"/>
+              </a:defRPr>
+            </a:lvl1pPr>
+          </a:lstStyle>
+          <a:p>
+            <a:r>
+              <a:rPr lang="fr-FR" dirty="0" smtClean="0"/>
+              <a:t>-</a:t>
+            </a:r>
+            <a:endParaRPr lang="fr-FR" dirty="0"/>
+          </a:p>
+        </p:txBody>
+      </p:sp>
+    </p:spTree>
+    <p:extLst>
+      <p:ext uri="{BB962C8B-B14F-4D97-AF65-F5344CB8AC3E}">
+        <p14:creationId xmlns:p14="http://schemas.microsoft.com/office/powerpoint/2010/main" val="671990365"/>
+      </p:ext>
+    </p:extLst>
+  </p:cSld>
+  <p:clrMapOvr>
+    <a:masterClrMapping/>
+  </p:clrMapOvr>
+  <p:timing>
+    <p:tnLst>
+      <p:par>
+        <p:cTn id="1" dur="indefinite" restart="never" nodeType="tmRoot"/>
+      </p:par>
+    </p:tnLst>
+  </p:timing>
+</p:sld>
+</file>
+
+<file path=ppt/slides/slide11.xml><?xml version="1.0" encoding="utf-8"?>
+<p:sld xmlns:a="http://schemas.openxmlformats.org/drawingml/2006/main" xmlns:r="http://schemas.openxmlformats.org/officeDocument/2006/relationships" xmlns:p="http://schemas.openxmlformats.org/presentationml/2006/main">
+  <p:cSld>
+    <p:spTree>
+      <p:nvGrpSpPr>
+        <p:cNvPr id="1" name=""/>
+        <p:cNvGrpSpPr/>
+        <p:nvPr/>
+      </p:nvGrpSpPr>
+      <p:grpSpPr>
+        <a:xfrm>
+          <a:off x="0" y="0"/>
+          <a:ext cx="0" cy="0"/>
+          <a:chOff x="0" y="0"/>
+          <a:chExt cx="0" cy="0"/>
+        </a:xfrm>
+      </p:grpSpPr>
+      <p:sp>
+        <p:nvSpPr>
+          <p:cNvPr id="6" name="Rectangle 5"/>
+          <p:cNvSpPr/>
+          <p:nvPr/>
+        </p:nvSpPr>
+        <p:spPr>
+          <a:xfrm>
+            <a:off x="0" y="0"/>
+            <a:ext cx="9144000" cy="6858000"/>
+          </a:xfrm>
+          <a:prstGeom prst="rect">
+            <a:avLst/>
+          </a:prstGeom>
+          <a:solidFill>
+            <a:srgbClr val="FFC000">
+              <a:alpha val="0"/>
+            </a:srgbClr>
+          </a:solidFill>
+          <a:ln w="101600">
+            <a:solidFill>
+              <a:schemeClr val="tx1"/>
+            </a:solidFill>
+          </a:ln>
+        </p:spPr>
+        <p:style>
+          <a:lnRef idx="2">
+            <a:schemeClr val="accent1">
+              <a:shade val="50000"/>
+            </a:schemeClr>
+          </a:lnRef>
+          <a:fillRef idx="1">
+            <a:schemeClr val="accent1"/>
+          </a:fillRef>
+          <a:effectRef idx="0">
+            <a:schemeClr val="accent1"/>
+          </a:effectRef>
+          <a:fontRef idx="minor">
+            <a:schemeClr val="lt1"/>
+          </a:fontRef>
+        </p:style>
+        <p:txBody>
+          <a:bodyPr rtlCol="0" anchor="ctr"/>
+          <a:lstStyle/>
+          <a:p>
+            <a:pPr algn="ctr"/>
+            <a:endParaRPr lang="fr-FR">
+              <a:solidFill>
+                <a:srgbClr val="FFC000"/>
+              </a:solidFill>
+            </a:endParaRPr>
+          </a:p>
+        </p:txBody>
+      </p:sp>
+      <p:sp>
+        <p:nvSpPr>
+          <p:cNvPr id="2" name="Titre 1"/>
+          <p:cNvSpPr>
+            <a:spLocks noGrp="1"/>
+          </p:cNvSpPr>
+          <p:nvPr>
+            <p:ph type="ctrTitle"/>
+          </p:nvPr>
+        </p:nvSpPr>
+        <p:spPr>
+          <a:xfrm>
+            <a:off x="323528" y="332656"/>
+            <a:ext cx="2304256" cy="936104"/>
+          </a:xfrm>
+        </p:spPr>
+        <p:txBody>
+          <a:bodyPr>
+            <a:noAutofit/>
+          </a:bodyPr>
+          <a:lstStyle/>
+          <a:p>
+            <a:r>
+              <a:rPr lang="fr-FR" sz="7200" dirty="0" smtClean="0"/>
+              <a:t>-</a:t>
+            </a:r>
+            <a:endParaRPr lang="fr-FR" sz="7200" dirty="0"/>
+          </a:p>
+        </p:txBody>
+      </p:sp>
+      <p:sp>
+        <p:nvSpPr>
+          <p:cNvPr id="3" name="Sous-titre 2"/>
+          <p:cNvSpPr>
+            <a:spLocks noGrp="1"/>
+          </p:cNvSpPr>
+          <p:nvPr>
+            <p:ph type="subTitle" idx="1"/>
+          </p:nvPr>
+        </p:nvSpPr>
+        <p:spPr>
+          <a:xfrm>
+            <a:off x="1907704" y="2744924"/>
+            <a:ext cx="4856584" cy="1368152"/>
+          </a:xfrm>
+        </p:spPr>
+        <p:txBody>
+          <a:bodyPr vert="horz" lIns="91440" tIns="45720" rIns="91440" bIns="45720" rtlCol="0" anchor="ctr">
+            <a:noAutofit/>
+          </a:bodyPr>
+          <a:lstStyle/>
+          <a:p>
+            <a:pPr>
+              <a:spcBef>
+                <a:spcPct val="0"/>
+              </a:spcBef>
+            </a:pPr>
+            <a:r>
+              <a:rPr lang="fr-FR" sz="7200" dirty="0" err="1">
+                <a:solidFill>
+                  <a:schemeClr val="tx1"/>
+                </a:solidFill>
+                <a:latin typeface="+mj-lt"/>
+                <a:ea typeface="+mj-ea"/>
+                <a:cs typeface="+mj-cs"/>
+              </a:rPr>
+              <a:t>Évax</a:t>
+            </a:r>
+            <a:r>
+              <a:rPr lang="fr-FR" sz="7200" dirty="0">
+                <a:solidFill>
+                  <a:schemeClr val="tx1"/>
+                </a:solidFill>
+                <a:latin typeface="+mj-lt"/>
+                <a:ea typeface="+mj-ea"/>
+                <a:cs typeface="+mj-cs"/>
+              </a:rPr>
+              <a:t> pygmée</a:t>
+            </a:r>
+          </a:p>
+        </p:txBody>
+      </p:sp>
+      <p:sp>
+        <p:nvSpPr>
+          <p:cNvPr id="4" name="Titre 1"/>
+          <p:cNvSpPr txBox="1">
+            <a:spLocks/>
+          </p:cNvSpPr>
+          <p:nvPr/>
+        </p:nvSpPr>
+        <p:spPr>
+          <a:xfrm>
+            <a:off x="7452320" y="260648"/>
+            <a:ext cx="1368152" cy="648072"/>
+          </a:xfrm>
+          <a:prstGeom prst="rect">
+            <a:avLst/>
+          </a:prstGeom>
+        </p:spPr>
+        <p:txBody>
+          <a:bodyPr vert="horz" lIns="91440" tIns="45720" rIns="91440" bIns="45720" rtlCol="0" anchor="ctr">
+            <a:noAutofit/>
+          </a:bodyPr>
+          <a:lstStyle>
+            <a:lvl1pPr algn="ctr">
+              <a:spcBef>
+                <a:spcPct val="0"/>
+              </a:spcBef>
+              <a:buNone/>
+              <a:defRPr sz="7200">
+                <a:latin typeface="+mj-lt"/>
+                <a:ea typeface="+mj-ea"/>
+                <a:cs typeface="+mj-cs"/>
+              </a:defRPr>
+            </a:lvl1pPr>
+          </a:lstStyle>
+          <a:p>
+            <a:endParaRPr lang="fr-FR" dirty="0"/>
+          </a:p>
+        </p:txBody>
+      </p:sp>
+      <p:sp>
+        <p:nvSpPr>
+          <p:cNvPr id="5" name="Titre 1"/>
+          <p:cNvSpPr txBox="1">
+            <a:spLocks/>
+          </p:cNvSpPr>
+          <p:nvPr/>
+        </p:nvSpPr>
+        <p:spPr>
+          <a:xfrm>
+            <a:off x="467544" y="5805264"/>
+            <a:ext cx="2103218" cy="648072"/>
+          </a:xfrm>
+          <a:prstGeom prst="rect">
+            <a:avLst/>
+          </a:prstGeom>
+        </p:spPr>
+        <p:txBody>
+          <a:bodyPr vert="horz" lIns="91440" tIns="45720" rIns="91440" bIns="45720" rtlCol="0" anchor="ctr">
+            <a:noAutofit/>
+          </a:bodyPr>
+          <a:lstStyle>
+            <a:defPPr>
+              <a:defRPr lang="fr-FR"/>
+            </a:defPPr>
+            <a:lvl1pPr algn="ctr">
+              <a:spcBef>
+                <a:spcPct val="0"/>
+              </a:spcBef>
+              <a:buNone/>
+              <a:defRPr sz="7200">
+                <a:latin typeface="+mj-lt"/>
+                <a:ea typeface="+mj-ea"/>
+                <a:cs typeface="+mj-cs"/>
+              </a:defRPr>
+            </a:lvl1pPr>
+          </a:lstStyle>
+          <a:p>
+            <a:r>
+              <a:rPr lang="fr-FR" dirty="0" err="1"/>
+              <a:t>Niv</a:t>
+            </a:r>
+            <a:r>
+              <a:rPr lang="fr-FR" dirty="0"/>
+              <a:t> </a:t>
+            </a:r>
+            <a:r>
+              <a:rPr lang="fr-FR" dirty="0" smtClean="0"/>
+              <a:t>3</a:t>
+            </a:r>
+            <a:endParaRPr lang="fr-FR" dirty="0"/>
+          </a:p>
+        </p:txBody>
+      </p:sp>
+      <p:sp>
+        <p:nvSpPr>
+          <p:cNvPr id="7" name="Titre 1"/>
+          <p:cNvSpPr txBox="1">
+            <a:spLocks/>
+          </p:cNvSpPr>
+          <p:nvPr/>
+        </p:nvSpPr>
+        <p:spPr>
+          <a:xfrm>
+            <a:off x="5076056" y="4905164"/>
+            <a:ext cx="3528392" cy="1800200"/>
+          </a:xfrm>
+          <a:prstGeom prst="rect">
+            <a:avLst/>
+          </a:prstGeom>
+        </p:spPr>
+        <p:txBody>
+          <a:bodyPr vert="horz" lIns="91440" tIns="45720" rIns="91440" bIns="45720" rtlCol="0" anchor="ctr">
+            <a:noAutofit/>
+          </a:bodyPr>
+          <a:lstStyle>
+            <a:defPPr>
+              <a:defRPr lang="fr-FR"/>
+            </a:defPPr>
+            <a:lvl1pPr algn="ctr">
+              <a:spcBef>
+                <a:spcPct val="0"/>
+              </a:spcBef>
+              <a:buNone/>
+              <a:defRPr sz="7200">
+                <a:latin typeface="+mj-lt"/>
+                <a:ea typeface="+mj-ea"/>
+                <a:cs typeface="+mj-cs"/>
+              </a:defRPr>
+            </a:lvl1pPr>
+          </a:lstStyle>
+          <a:p>
+            <a:r>
+              <a:rPr lang="fr-FR" sz="6000" dirty="0" smtClean="0"/>
+              <a:t> -1 At </a:t>
+            </a:r>
+            <a:endParaRPr lang="fr-FR" sz="6000" dirty="0"/>
+          </a:p>
+        </p:txBody>
+      </p:sp>
+      <p:sp>
+        <p:nvSpPr>
+          <p:cNvPr id="8" name="Titre 1"/>
+          <p:cNvSpPr txBox="1">
+            <a:spLocks/>
+          </p:cNvSpPr>
+          <p:nvPr/>
+        </p:nvSpPr>
+        <p:spPr>
+          <a:xfrm>
+            <a:off x="7604720" y="413048"/>
+            <a:ext cx="1368152" cy="648072"/>
+          </a:xfrm>
+          <a:prstGeom prst="rect">
+            <a:avLst/>
+          </a:prstGeom>
+        </p:spPr>
+        <p:txBody>
+          <a:bodyPr vert="horz" lIns="91440" tIns="45720" rIns="91440" bIns="45720" rtlCol="0" anchor="ctr">
+            <a:noAutofit/>
+          </a:bodyPr>
+          <a:lstStyle>
+            <a:lvl1pPr algn="ctr">
+              <a:spcBef>
+                <a:spcPct val="0"/>
+              </a:spcBef>
+              <a:buNone/>
+              <a:defRPr sz="7200">
+                <a:latin typeface="+mj-lt"/>
+                <a:ea typeface="+mj-ea"/>
+                <a:cs typeface="+mj-cs"/>
+              </a:defRPr>
+            </a:lvl1pPr>
+          </a:lstStyle>
+          <a:p>
+            <a:r>
+              <a:rPr lang="fr-FR" dirty="0" smtClean="0"/>
+              <a:t>-</a:t>
+            </a:r>
+            <a:endParaRPr lang="fr-FR" dirty="0"/>
+          </a:p>
+        </p:txBody>
+      </p:sp>
+    </p:spTree>
+    <p:extLst>
+      <p:ext uri="{BB962C8B-B14F-4D97-AF65-F5344CB8AC3E}">
+        <p14:creationId xmlns:p14="http://schemas.microsoft.com/office/powerpoint/2010/main" val="302146750"/>
+      </p:ext>
+    </p:extLst>
+  </p:cSld>
+  <p:clrMapOvr>
+    <a:masterClrMapping/>
+  </p:clrMapOvr>
+  <p:timing>
+    <p:tnLst>
+      <p:par>
+        <p:cTn id="1" dur="indefinite" restart="never" nodeType="tmRoot"/>
+      </p:par>
+    </p:tnLst>
+  </p:timing>
+</p:sld>
+</file>
+
+<file path=ppt/slides/slide12.xml><?xml version="1.0" encoding="utf-8"?>
+<p:sld xmlns:a="http://schemas.openxmlformats.org/drawingml/2006/main" xmlns:r="http://schemas.openxmlformats.org/officeDocument/2006/relationships" xmlns:p="http://schemas.openxmlformats.org/presentationml/2006/main">
+  <p:cSld>
+    <p:spTree>
+      <p:nvGrpSpPr>
+        <p:cNvPr id="1" name=""/>
+        <p:cNvGrpSpPr/>
+        <p:nvPr/>
+      </p:nvGrpSpPr>
+      <p:grpSpPr>
+        <a:xfrm>
+          <a:off x="0" y="0"/>
+          <a:ext cx="0" cy="0"/>
+          <a:chOff x="0" y="0"/>
+          <a:chExt cx="0" cy="0"/>
+        </a:xfrm>
+      </p:grpSpPr>
+      <p:sp>
+        <p:nvSpPr>
+          <p:cNvPr id="6" name="Rectangle 5"/>
+          <p:cNvSpPr/>
+          <p:nvPr/>
+        </p:nvSpPr>
+        <p:spPr>
+          <a:xfrm>
+            <a:off x="0" y="0"/>
+            <a:ext cx="9144000" cy="6858000"/>
+          </a:xfrm>
+          <a:prstGeom prst="rect">
+            <a:avLst/>
+          </a:prstGeom>
+          <a:solidFill>
+            <a:srgbClr val="FFC000">
+              <a:alpha val="0"/>
+            </a:srgbClr>
+          </a:solidFill>
+          <a:ln w="101600">
+            <a:solidFill>
+              <a:schemeClr val="tx1"/>
+            </a:solidFill>
+          </a:ln>
+        </p:spPr>
+        <p:style>
+          <a:lnRef idx="2">
+            <a:schemeClr val="accent1">
+              <a:shade val="50000"/>
+            </a:schemeClr>
+          </a:lnRef>
+          <a:fillRef idx="1">
+            <a:schemeClr val="accent1"/>
+          </a:fillRef>
+          <a:effectRef idx="0">
+            <a:schemeClr val="accent1"/>
+          </a:effectRef>
+          <a:fontRef idx="minor">
+            <a:schemeClr val="lt1"/>
+          </a:fontRef>
+        </p:style>
+        <p:txBody>
+          <a:bodyPr rtlCol="0" anchor="ctr"/>
+          <a:lstStyle/>
+          <a:p>
+            <a:pPr algn="ctr"/>
+            <a:endParaRPr lang="fr-FR">
+              <a:solidFill>
+                <a:srgbClr val="FFC000"/>
+              </a:solidFill>
+            </a:endParaRPr>
+          </a:p>
+        </p:txBody>
+      </p:sp>
+      <p:sp>
+        <p:nvSpPr>
+          <p:cNvPr id="2" name="Titre 1"/>
+          <p:cNvSpPr>
+            <a:spLocks noGrp="1"/>
+          </p:cNvSpPr>
+          <p:nvPr>
+            <p:ph type="ctrTitle"/>
+          </p:nvPr>
+        </p:nvSpPr>
+        <p:spPr>
+          <a:xfrm>
+            <a:off x="323528" y="332656"/>
+            <a:ext cx="2304256" cy="936104"/>
+          </a:xfrm>
+        </p:spPr>
+        <p:txBody>
+          <a:bodyPr>
+            <a:noAutofit/>
+          </a:bodyPr>
+          <a:lstStyle/>
+          <a:p>
+            <a:r>
+              <a:rPr lang="fr-FR" sz="7200" dirty="0" smtClean="0"/>
+              <a:t>-</a:t>
+            </a:r>
+            <a:endParaRPr lang="fr-FR" sz="7200" dirty="0"/>
+          </a:p>
+        </p:txBody>
+      </p:sp>
+      <p:sp>
+        <p:nvSpPr>
+          <p:cNvPr id="3" name="Sous-titre 2"/>
+          <p:cNvSpPr>
+            <a:spLocks noGrp="1"/>
+          </p:cNvSpPr>
+          <p:nvPr>
+            <p:ph type="subTitle" idx="1"/>
+          </p:nvPr>
+        </p:nvSpPr>
+        <p:spPr>
+          <a:xfrm>
+            <a:off x="1907704" y="2744924"/>
+            <a:ext cx="4856584" cy="1368152"/>
+          </a:xfrm>
+        </p:spPr>
+        <p:txBody>
+          <a:bodyPr vert="horz" lIns="91440" tIns="45720" rIns="91440" bIns="45720" rtlCol="0" anchor="ctr">
+            <a:noAutofit/>
+          </a:bodyPr>
+          <a:lstStyle/>
+          <a:p>
+            <a:pPr>
+              <a:spcBef>
+                <a:spcPct val="0"/>
+              </a:spcBef>
+            </a:pPr>
+            <a:r>
+              <a:rPr lang="fr-FR" sz="7200" dirty="0" smtClean="0">
+                <a:solidFill>
+                  <a:schemeClr val="tx1"/>
+                </a:solidFill>
+                <a:latin typeface="+mj-lt"/>
+                <a:ea typeface="+mj-ea"/>
+                <a:cs typeface="+mj-cs"/>
+              </a:rPr>
+              <a:t>Escargot </a:t>
+            </a:r>
+            <a:r>
+              <a:rPr lang="fr-FR" sz="7200" dirty="0" err="1">
+                <a:solidFill>
+                  <a:schemeClr val="tx1"/>
+                </a:solidFill>
+                <a:latin typeface="+mj-lt"/>
+                <a:ea typeface="+mj-ea"/>
+                <a:cs typeface="+mj-cs"/>
+              </a:rPr>
+              <a:t>mourguéta</a:t>
+            </a:r>
+            <a:endParaRPr lang="fr-FR" sz="7200" dirty="0">
+              <a:solidFill>
+                <a:schemeClr val="tx1"/>
+              </a:solidFill>
+              <a:latin typeface="+mj-lt"/>
+              <a:ea typeface="+mj-ea"/>
+              <a:cs typeface="+mj-cs"/>
+            </a:endParaRPr>
+          </a:p>
+        </p:txBody>
+      </p:sp>
+      <p:sp>
+        <p:nvSpPr>
+          <p:cNvPr id="4" name="Titre 1"/>
+          <p:cNvSpPr txBox="1">
+            <a:spLocks/>
+          </p:cNvSpPr>
+          <p:nvPr/>
+        </p:nvSpPr>
+        <p:spPr>
+          <a:xfrm>
+            <a:off x="7452320" y="260648"/>
+            <a:ext cx="1368152" cy="648072"/>
+          </a:xfrm>
+          <a:prstGeom prst="rect">
+            <a:avLst/>
+          </a:prstGeom>
+        </p:spPr>
+        <p:txBody>
+          <a:bodyPr vert="horz" lIns="91440" tIns="45720" rIns="91440" bIns="45720" rtlCol="0" anchor="ctr">
+            <a:noAutofit/>
+          </a:bodyPr>
+          <a:lstStyle>
+            <a:lvl1pPr algn="ctr">
+              <a:spcBef>
+                <a:spcPct val="0"/>
+              </a:spcBef>
+              <a:buNone/>
+              <a:defRPr sz="7200">
+                <a:latin typeface="+mj-lt"/>
+                <a:ea typeface="+mj-ea"/>
+                <a:cs typeface="+mj-cs"/>
+              </a:defRPr>
+            </a:lvl1pPr>
+          </a:lstStyle>
+          <a:p>
+            <a:endParaRPr lang="fr-FR" dirty="0"/>
+          </a:p>
+        </p:txBody>
+      </p:sp>
+      <p:sp>
+        <p:nvSpPr>
+          <p:cNvPr id="5" name="Titre 1"/>
+          <p:cNvSpPr txBox="1">
+            <a:spLocks/>
+          </p:cNvSpPr>
+          <p:nvPr/>
+        </p:nvSpPr>
+        <p:spPr>
+          <a:xfrm>
+            <a:off x="467544" y="5805264"/>
+            <a:ext cx="2103218" cy="648072"/>
+          </a:xfrm>
+          <a:prstGeom prst="rect">
+            <a:avLst/>
+          </a:prstGeom>
+        </p:spPr>
+        <p:txBody>
+          <a:bodyPr vert="horz" lIns="91440" tIns="45720" rIns="91440" bIns="45720" rtlCol="0" anchor="ctr">
+            <a:noAutofit/>
+          </a:bodyPr>
+          <a:lstStyle>
+            <a:defPPr>
+              <a:defRPr lang="fr-FR"/>
+            </a:defPPr>
+            <a:lvl1pPr algn="ctr">
+              <a:spcBef>
+                <a:spcPct val="0"/>
+              </a:spcBef>
+              <a:buNone/>
+              <a:defRPr sz="7200">
+                <a:latin typeface="+mj-lt"/>
+                <a:ea typeface="+mj-ea"/>
+                <a:cs typeface="+mj-cs"/>
+              </a:defRPr>
+            </a:lvl1pPr>
+          </a:lstStyle>
+          <a:p>
+            <a:r>
+              <a:rPr lang="fr-FR" dirty="0" err="1"/>
+              <a:t>Niv</a:t>
+            </a:r>
+            <a:r>
+              <a:rPr lang="fr-FR" dirty="0"/>
+              <a:t> </a:t>
+            </a:r>
+            <a:r>
+              <a:rPr lang="fr-FR" dirty="0" smtClean="0"/>
+              <a:t>8</a:t>
+            </a:r>
+            <a:endParaRPr lang="fr-FR" dirty="0"/>
+          </a:p>
+        </p:txBody>
+      </p:sp>
+      <p:sp>
+        <p:nvSpPr>
+          <p:cNvPr id="7" name="Titre 1"/>
+          <p:cNvSpPr txBox="1">
+            <a:spLocks/>
+          </p:cNvSpPr>
+          <p:nvPr/>
+        </p:nvSpPr>
+        <p:spPr>
+          <a:xfrm>
+            <a:off x="4572000" y="4905164"/>
+            <a:ext cx="4032448" cy="1800200"/>
+          </a:xfrm>
+          <a:prstGeom prst="rect">
+            <a:avLst/>
+          </a:prstGeom>
+        </p:spPr>
+        <p:txBody>
+          <a:bodyPr vert="horz" lIns="91440" tIns="45720" rIns="91440" bIns="45720" rtlCol="0" anchor="ctr">
+            <a:noAutofit/>
+          </a:bodyPr>
+          <a:lstStyle>
+            <a:defPPr>
+              <a:defRPr lang="fr-FR"/>
+            </a:defPPr>
+            <a:lvl1pPr algn="ctr">
+              <a:spcBef>
+                <a:spcPct val="0"/>
+              </a:spcBef>
+              <a:buNone/>
+              <a:defRPr sz="7200">
+                <a:latin typeface="+mj-lt"/>
+                <a:ea typeface="+mj-ea"/>
+                <a:cs typeface="+mj-cs"/>
+              </a:defRPr>
+            </a:lvl1pPr>
+          </a:lstStyle>
+          <a:p>
+            <a:r>
+              <a:rPr lang="fr-FR" sz="4800" dirty="0" smtClean="0"/>
+              <a:t> chaque action coût +1 </a:t>
+            </a:r>
+            <a:endParaRPr lang="fr-FR" sz="4800" dirty="0"/>
+          </a:p>
+        </p:txBody>
+      </p:sp>
+      <p:sp>
+        <p:nvSpPr>
+          <p:cNvPr id="8" name="Titre 1"/>
+          <p:cNvSpPr txBox="1">
+            <a:spLocks/>
+          </p:cNvSpPr>
+          <p:nvPr/>
+        </p:nvSpPr>
+        <p:spPr>
+          <a:xfrm>
+            <a:off x="7604720" y="413048"/>
+            <a:ext cx="1368152" cy="648072"/>
+          </a:xfrm>
+          <a:prstGeom prst="rect">
+            <a:avLst/>
+          </a:prstGeom>
+        </p:spPr>
+        <p:txBody>
+          <a:bodyPr vert="horz" lIns="91440" tIns="45720" rIns="91440" bIns="45720" rtlCol="0" anchor="ctr">
+            <a:noAutofit/>
+          </a:bodyPr>
+          <a:lstStyle>
+            <a:lvl1pPr algn="ctr">
+              <a:spcBef>
+                <a:spcPct val="0"/>
+              </a:spcBef>
+              <a:buNone/>
+              <a:defRPr sz="7200">
+                <a:latin typeface="+mj-lt"/>
+                <a:ea typeface="+mj-ea"/>
+                <a:cs typeface="+mj-cs"/>
+              </a:defRPr>
+            </a:lvl1pPr>
+          </a:lstStyle>
+          <a:p>
+            <a:r>
+              <a:rPr lang="fr-FR" dirty="0" smtClean="0"/>
+              <a:t>-</a:t>
+            </a:r>
+            <a:endParaRPr lang="fr-FR" dirty="0"/>
+          </a:p>
+        </p:txBody>
+      </p:sp>
+    </p:spTree>
+    <p:extLst>
+      <p:ext uri="{BB962C8B-B14F-4D97-AF65-F5344CB8AC3E}">
+        <p14:creationId xmlns:p14="http://schemas.microsoft.com/office/powerpoint/2010/main" val="3234651271"/>
+      </p:ext>
+    </p:extLst>
+  </p:cSld>
+  <p:clrMapOvr>
+    <a:masterClrMapping/>
+  </p:clrMapOvr>
+  <p:timing>
+    <p:tnLst>
+      <p:par>
+        <p:cTn id="1" dur="indefinite" restart="never" nodeType="tmRoot"/>
+      </p:par>
+    </p:tnLst>
+  </p:timing>
+</p:sld>
+</file>
+
+<file path=ppt/slides/slide13.xml><?xml version="1.0" encoding="utf-8"?>
+<p:sld xmlns:a="http://schemas.openxmlformats.org/drawingml/2006/main" xmlns:r="http://schemas.openxmlformats.org/officeDocument/2006/relationships" xmlns:p="http://schemas.openxmlformats.org/presentationml/2006/main">
+  <p:cSld>
+    <p:spTree>
+      <p:nvGrpSpPr>
+        <p:cNvPr id="1" name=""/>
+        <p:cNvGrpSpPr/>
+        <p:nvPr/>
+      </p:nvGrpSpPr>
+      <p:grpSpPr>
+        <a:xfrm>
+          <a:off x="0" y="0"/>
+          <a:ext cx="0" cy="0"/>
+          <a:chOff x="0" y="0"/>
+          <a:chExt cx="0" cy="0"/>
+        </a:xfrm>
+      </p:grpSpPr>
+      <p:sp>
+        <p:nvSpPr>
+          <p:cNvPr id="6" name="Rectangle 5"/>
+          <p:cNvSpPr/>
+          <p:nvPr/>
+        </p:nvSpPr>
+        <p:spPr>
+          <a:xfrm>
+            <a:off x="0" y="0"/>
+            <a:ext cx="9144000" cy="6858000"/>
+          </a:xfrm>
+          <a:prstGeom prst="rect">
+            <a:avLst/>
+          </a:prstGeom>
+          <a:solidFill>
+            <a:srgbClr val="FFC000">
+              <a:alpha val="0"/>
+            </a:srgbClr>
+          </a:solidFill>
+          <a:ln w="101600">
+            <a:solidFill>
+              <a:schemeClr val="tx1"/>
+            </a:solidFill>
+          </a:ln>
+        </p:spPr>
+        <p:style>
+          <a:lnRef idx="2">
+            <a:schemeClr val="accent1">
+              <a:shade val="50000"/>
+            </a:schemeClr>
+          </a:lnRef>
+          <a:fillRef idx="1">
+            <a:schemeClr val="accent1"/>
+          </a:fillRef>
+          <a:effectRef idx="0">
+            <a:schemeClr val="accent1"/>
+          </a:effectRef>
+          <a:fontRef idx="minor">
+            <a:schemeClr val="lt1"/>
+          </a:fontRef>
+        </p:style>
+        <p:txBody>
+          <a:bodyPr rtlCol="0" anchor="ctr"/>
+          <a:lstStyle/>
+          <a:p>
+            <a:pPr algn="ctr"/>
+            <a:endParaRPr lang="fr-FR">
+              <a:solidFill>
+                <a:srgbClr val="FFC000"/>
+              </a:solidFill>
+            </a:endParaRPr>
+          </a:p>
+        </p:txBody>
+      </p:sp>
+      <p:sp>
+        <p:nvSpPr>
+          <p:cNvPr id="2" name="Titre 1"/>
+          <p:cNvSpPr>
+            <a:spLocks noGrp="1"/>
+          </p:cNvSpPr>
+          <p:nvPr>
+            <p:ph type="ctrTitle"/>
+          </p:nvPr>
+        </p:nvSpPr>
+        <p:spPr>
+          <a:xfrm>
+            <a:off x="323528" y="332656"/>
+            <a:ext cx="2304256" cy="936104"/>
+          </a:xfrm>
+        </p:spPr>
+        <p:txBody>
+          <a:bodyPr>
+            <a:noAutofit/>
+          </a:bodyPr>
+          <a:lstStyle/>
+          <a:p>
+            <a:r>
+              <a:rPr lang="fr-FR" sz="7200" dirty="0" smtClean="0"/>
+              <a:t>-</a:t>
+            </a:r>
+            <a:endParaRPr lang="fr-FR" sz="7200" dirty="0"/>
+          </a:p>
+        </p:txBody>
+      </p:sp>
+      <p:sp>
+        <p:nvSpPr>
+          <p:cNvPr id="3" name="Sous-titre 2"/>
+          <p:cNvSpPr>
+            <a:spLocks noGrp="1"/>
+          </p:cNvSpPr>
+          <p:nvPr>
+            <p:ph type="subTitle" idx="1"/>
+          </p:nvPr>
+        </p:nvSpPr>
+        <p:spPr>
+          <a:xfrm>
+            <a:off x="1907704" y="2744924"/>
+            <a:ext cx="4856584" cy="1368152"/>
+          </a:xfrm>
+        </p:spPr>
+        <p:txBody>
+          <a:bodyPr vert="horz" lIns="91440" tIns="45720" rIns="91440" bIns="45720" rtlCol="0" anchor="ctr">
+            <a:noAutofit/>
+          </a:bodyPr>
+          <a:lstStyle/>
+          <a:p>
+            <a:pPr>
+              <a:spcBef>
+                <a:spcPct val="0"/>
+              </a:spcBef>
+            </a:pPr>
+            <a:r>
+              <a:rPr lang="fr-FR" sz="7200" dirty="0" smtClean="0">
+                <a:solidFill>
+                  <a:schemeClr val="tx1"/>
+                </a:solidFill>
+                <a:latin typeface="+mj-lt"/>
+                <a:ea typeface="+mj-ea"/>
+                <a:cs typeface="+mj-cs"/>
+              </a:rPr>
+              <a:t>Escargot </a:t>
+            </a:r>
+            <a:r>
+              <a:rPr lang="fr-FR" sz="7200" dirty="0" err="1">
+                <a:solidFill>
+                  <a:schemeClr val="tx1"/>
+                </a:solidFill>
+                <a:latin typeface="+mj-lt"/>
+                <a:ea typeface="+mj-ea"/>
+                <a:cs typeface="+mj-cs"/>
+              </a:rPr>
+              <a:t>mourguéta</a:t>
+            </a:r>
+            <a:endParaRPr lang="fr-FR" sz="7200" dirty="0">
+              <a:solidFill>
+                <a:schemeClr val="tx1"/>
+              </a:solidFill>
+              <a:latin typeface="+mj-lt"/>
+              <a:ea typeface="+mj-ea"/>
+              <a:cs typeface="+mj-cs"/>
+            </a:endParaRPr>
+          </a:p>
+        </p:txBody>
+      </p:sp>
+      <p:sp>
+        <p:nvSpPr>
+          <p:cNvPr id="4" name="Titre 1"/>
+          <p:cNvSpPr txBox="1">
+            <a:spLocks/>
+          </p:cNvSpPr>
+          <p:nvPr/>
+        </p:nvSpPr>
+        <p:spPr>
+          <a:xfrm>
+            <a:off x="7452320" y="260648"/>
+            <a:ext cx="1368152" cy="648072"/>
+          </a:xfrm>
+          <a:prstGeom prst="rect">
+            <a:avLst/>
+          </a:prstGeom>
+        </p:spPr>
+        <p:txBody>
+          <a:bodyPr vert="horz" lIns="91440" tIns="45720" rIns="91440" bIns="45720" rtlCol="0" anchor="ctr">
+            <a:noAutofit/>
+          </a:bodyPr>
+          <a:lstStyle>
+            <a:lvl1pPr algn="ctr">
+              <a:spcBef>
+                <a:spcPct val="0"/>
+              </a:spcBef>
+              <a:buNone/>
+              <a:defRPr sz="7200">
+                <a:latin typeface="+mj-lt"/>
+                <a:ea typeface="+mj-ea"/>
+                <a:cs typeface="+mj-cs"/>
+              </a:defRPr>
+            </a:lvl1pPr>
+          </a:lstStyle>
+          <a:p>
+            <a:endParaRPr lang="fr-FR" dirty="0"/>
+          </a:p>
+        </p:txBody>
+      </p:sp>
+      <p:sp>
+        <p:nvSpPr>
+          <p:cNvPr id="5" name="Titre 1"/>
+          <p:cNvSpPr txBox="1">
+            <a:spLocks/>
+          </p:cNvSpPr>
+          <p:nvPr/>
+        </p:nvSpPr>
+        <p:spPr>
+          <a:xfrm>
+            <a:off x="467544" y="5805264"/>
+            <a:ext cx="2103218" cy="648072"/>
+          </a:xfrm>
+          <a:prstGeom prst="rect">
+            <a:avLst/>
+          </a:prstGeom>
+        </p:spPr>
+        <p:txBody>
+          <a:bodyPr vert="horz" lIns="91440" tIns="45720" rIns="91440" bIns="45720" rtlCol="0" anchor="ctr">
+            <a:noAutofit/>
+          </a:bodyPr>
+          <a:lstStyle>
+            <a:defPPr>
+              <a:defRPr lang="fr-FR"/>
+            </a:defPPr>
+            <a:lvl1pPr algn="ctr">
+              <a:spcBef>
+                <a:spcPct val="0"/>
+              </a:spcBef>
+              <a:buNone/>
+              <a:defRPr sz="7200">
+                <a:latin typeface="+mj-lt"/>
+                <a:ea typeface="+mj-ea"/>
+                <a:cs typeface="+mj-cs"/>
+              </a:defRPr>
+            </a:lvl1pPr>
+          </a:lstStyle>
+          <a:p>
+            <a:r>
+              <a:rPr lang="fr-FR" dirty="0" err="1"/>
+              <a:t>Niv</a:t>
+            </a:r>
+            <a:r>
+              <a:rPr lang="fr-FR" dirty="0"/>
+              <a:t> </a:t>
+            </a:r>
+            <a:r>
+              <a:rPr lang="fr-FR" dirty="0" smtClean="0"/>
+              <a:t>8</a:t>
+            </a:r>
+            <a:endParaRPr lang="fr-FR" dirty="0"/>
+          </a:p>
+        </p:txBody>
+      </p:sp>
+      <p:sp>
+        <p:nvSpPr>
+          <p:cNvPr id="7" name="Titre 1"/>
+          <p:cNvSpPr txBox="1">
+            <a:spLocks/>
+          </p:cNvSpPr>
+          <p:nvPr/>
+        </p:nvSpPr>
+        <p:spPr>
+          <a:xfrm>
+            <a:off x="4572000" y="4905164"/>
+            <a:ext cx="4032448" cy="1800200"/>
+          </a:xfrm>
+          <a:prstGeom prst="rect">
+            <a:avLst/>
+          </a:prstGeom>
+        </p:spPr>
+        <p:txBody>
+          <a:bodyPr vert="horz" lIns="91440" tIns="45720" rIns="91440" bIns="45720" rtlCol="0" anchor="ctr">
+            <a:noAutofit/>
+          </a:bodyPr>
+          <a:lstStyle>
+            <a:defPPr>
+              <a:defRPr lang="fr-FR"/>
+            </a:defPPr>
+            <a:lvl1pPr algn="ctr">
+              <a:spcBef>
+                <a:spcPct val="0"/>
+              </a:spcBef>
+              <a:buNone/>
+              <a:defRPr sz="7200">
+                <a:latin typeface="+mj-lt"/>
+                <a:ea typeface="+mj-ea"/>
+                <a:cs typeface="+mj-cs"/>
+              </a:defRPr>
+            </a:lvl1pPr>
+          </a:lstStyle>
+          <a:p>
+            <a:r>
+              <a:rPr lang="fr-FR" sz="4800" dirty="0" smtClean="0"/>
+              <a:t> chaque action coût +1 </a:t>
+            </a:r>
+            <a:endParaRPr lang="fr-FR" sz="4800" dirty="0"/>
+          </a:p>
+        </p:txBody>
+      </p:sp>
+      <p:sp>
+        <p:nvSpPr>
+          <p:cNvPr id="8" name="Titre 1"/>
+          <p:cNvSpPr txBox="1">
+            <a:spLocks/>
+          </p:cNvSpPr>
+          <p:nvPr/>
+        </p:nvSpPr>
+        <p:spPr>
+          <a:xfrm>
+            <a:off x="7604720" y="413048"/>
+            <a:ext cx="1368152" cy="648072"/>
+          </a:xfrm>
+          <a:prstGeom prst="rect">
+            <a:avLst/>
+          </a:prstGeom>
+        </p:spPr>
+        <p:txBody>
+          <a:bodyPr vert="horz" lIns="91440" tIns="45720" rIns="91440" bIns="45720" rtlCol="0" anchor="ctr">
+            <a:noAutofit/>
+          </a:bodyPr>
+          <a:lstStyle>
+            <a:lvl1pPr algn="ctr">
+              <a:spcBef>
+                <a:spcPct val="0"/>
+              </a:spcBef>
+              <a:buNone/>
+              <a:defRPr sz="7200">
+                <a:latin typeface="+mj-lt"/>
+                <a:ea typeface="+mj-ea"/>
+                <a:cs typeface="+mj-cs"/>
+              </a:defRPr>
+            </a:lvl1pPr>
+          </a:lstStyle>
+          <a:p>
+            <a:r>
+              <a:rPr lang="fr-FR" dirty="0" smtClean="0"/>
+              <a:t>-</a:t>
+            </a:r>
+            <a:endParaRPr lang="fr-FR" dirty="0"/>
+          </a:p>
+        </p:txBody>
+      </p:sp>
+    </p:spTree>
+    <p:extLst>
+      <p:ext uri="{BB962C8B-B14F-4D97-AF65-F5344CB8AC3E}">
+        <p14:creationId xmlns:p14="http://schemas.microsoft.com/office/powerpoint/2010/main" val="3071950033"/>
+      </p:ext>
+    </p:extLst>
+  </p:cSld>
+  <p:clrMapOvr>
+    <a:masterClrMapping/>
+  </p:clrMapOvr>
+  <p:timing>
+    <p:tnLst>
+      <p:par>
+        <p:cTn id="1" dur="indefinite" restart="never" nodeType="tmRoot"/>
+      </p:par>
+    </p:tnLst>
+  </p:timing>
+</p:sld>
+</file>
+
+<file path=ppt/slides/slide14.xml><?xml version="1.0" encoding="utf-8"?>
+<p:sld xmlns:a="http://schemas.openxmlformats.org/drawingml/2006/main" xmlns:r="http://schemas.openxmlformats.org/officeDocument/2006/relationships" xmlns:p="http://schemas.openxmlformats.org/presentationml/2006/main">
+  <p:cSld>
+    <p:spTree>
+      <p:nvGrpSpPr>
+        <p:cNvPr id="1" name=""/>
+        <p:cNvGrpSpPr/>
+        <p:nvPr/>
+      </p:nvGrpSpPr>
+      <p:grpSpPr>
+        <a:xfrm>
+          <a:off x="0" y="0"/>
+          <a:ext cx="0" cy="0"/>
+          <a:chOff x="0" y="0"/>
+          <a:chExt cx="0" cy="0"/>
+        </a:xfrm>
+      </p:grpSpPr>
+      <p:sp>
+        <p:nvSpPr>
+          <p:cNvPr id="6" name="Rectangle 5"/>
+          <p:cNvSpPr/>
+          <p:nvPr/>
+        </p:nvSpPr>
+        <p:spPr>
+          <a:xfrm>
+            <a:off x="0" y="0"/>
+            <a:ext cx="9144000" cy="6858000"/>
+          </a:xfrm>
+          <a:prstGeom prst="rect">
+            <a:avLst/>
+          </a:prstGeom>
+          <a:solidFill>
+            <a:srgbClr val="FFC000">
+              <a:alpha val="0"/>
+            </a:srgbClr>
+          </a:solidFill>
+          <a:ln w="101600">
+            <a:solidFill>
+              <a:schemeClr val="tx1"/>
+            </a:solidFill>
+          </a:ln>
+        </p:spPr>
+        <p:style>
+          <a:lnRef idx="2">
+            <a:schemeClr val="accent1">
+              <a:shade val="50000"/>
+            </a:schemeClr>
+          </a:lnRef>
+          <a:fillRef idx="1">
+            <a:schemeClr val="accent1"/>
+          </a:fillRef>
+          <a:effectRef idx="0">
+            <a:schemeClr val="accent1"/>
+          </a:effectRef>
+          <a:fontRef idx="minor">
+            <a:schemeClr val="lt1"/>
+          </a:fontRef>
+        </p:style>
+        <p:txBody>
+          <a:bodyPr rtlCol="0" anchor="ctr"/>
+          <a:lstStyle/>
+          <a:p>
+            <a:pPr algn="ctr"/>
+            <a:endParaRPr lang="fr-FR">
+              <a:solidFill>
+                <a:srgbClr val="FFC000"/>
+              </a:solidFill>
+            </a:endParaRPr>
+          </a:p>
+        </p:txBody>
+      </p:sp>
+      <p:sp>
+        <p:nvSpPr>
+          <p:cNvPr id="2" name="Titre 1"/>
+          <p:cNvSpPr>
+            <a:spLocks noGrp="1"/>
+          </p:cNvSpPr>
+          <p:nvPr>
+            <p:ph type="ctrTitle"/>
+          </p:nvPr>
+        </p:nvSpPr>
+        <p:spPr>
+          <a:xfrm>
+            <a:off x="323528" y="332656"/>
+            <a:ext cx="2304256" cy="936104"/>
+          </a:xfrm>
+        </p:spPr>
+        <p:txBody>
+          <a:bodyPr>
+            <a:noAutofit/>
+          </a:bodyPr>
+          <a:lstStyle/>
+          <a:p>
+            <a:r>
+              <a:rPr lang="fr-FR" sz="7200" dirty="0" smtClean="0"/>
+              <a:t>-</a:t>
+            </a:r>
+            <a:endParaRPr lang="fr-FR" sz="7200" dirty="0"/>
+          </a:p>
+        </p:txBody>
+      </p:sp>
+      <p:sp>
+        <p:nvSpPr>
+          <p:cNvPr id="3" name="Sous-titre 2"/>
+          <p:cNvSpPr>
+            <a:spLocks noGrp="1"/>
+          </p:cNvSpPr>
+          <p:nvPr>
+            <p:ph type="subTitle" idx="1"/>
+          </p:nvPr>
+        </p:nvSpPr>
+        <p:spPr>
+          <a:xfrm>
+            <a:off x="1907704" y="2744924"/>
+            <a:ext cx="4856584" cy="1368152"/>
+          </a:xfrm>
+        </p:spPr>
+        <p:txBody>
+          <a:bodyPr>
+            <a:normAutofit fontScale="62500" lnSpcReduction="20000"/>
+          </a:bodyPr>
+          <a:lstStyle/>
+          <a:p>
+            <a:r>
+              <a:rPr lang="fr-FR" sz="8000" dirty="0">
+                <a:solidFill>
+                  <a:schemeClr val="tx1"/>
+                </a:solidFill>
+              </a:rPr>
+              <a:t>Lapin de garenne</a:t>
+            </a:r>
+          </a:p>
+        </p:txBody>
+      </p:sp>
+      <p:sp>
+        <p:nvSpPr>
+          <p:cNvPr id="4" name="Titre 1"/>
+          <p:cNvSpPr txBox="1">
+            <a:spLocks/>
+          </p:cNvSpPr>
+          <p:nvPr/>
+        </p:nvSpPr>
+        <p:spPr>
+          <a:xfrm>
+            <a:off x="7452320" y="260648"/>
+            <a:ext cx="1368152" cy="648072"/>
+          </a:xfrm>
+          <a:prstGeom prst="rect">
+            <a:avLst/>
+          </a:prstGeom>
+        </p:spPr>
+        <p:txBody>
+          <a:bodyPr vert="horz" lIns="91440" tIns="45720" rIns="91440" bIns="45720" rtlCol="0" anchor="ctr">
+            <a:noAutofit/>
+          </a:bodyPr>
+          <a:lstStyle>
+            <a:lvl1pPr algn="ctr">
+              <a:spcBef>
+                <a:spcPct val="0"/>
+              </a:spcBef>
+              <a:buNone/>
+              <a:defRPr sz="7200">
+                <a:latin typeface="+mj-lt"/>
+                <a:ea typeface="+mj-ea"/>
+                <a:cs typeface="+mj-cs"/>
+              </a:defRPr>
+            </a:lvl1pPr>
+          </a:lstStyle>
+          <a:p>
+            <a:endParaRPr lang="fr-FR" dirty="0"/>
+          </a:p>
+        </p:txBody>
+      </p:sp>
+      <p:sp>
+        <p:nvSpPr>
+          <p:cNvPr id="5" name="Titre 1"/>
+          <p:cNvSpPr txBox="1">
+            <a:spLocks/>
+          </p:cNvSpPr>
+          <p:nvPr/>
+        </p:nvSpPr>
+        <p:spPr>
+          <a:xfrm>
+            <a:off x="467544" y="5805264"/>
+            <a:ext cx="2103218" cy="648072"/>
+          </a:xfrm>
+          <a:prstGeom prst="rect">
+            <a:avLst/>
+          </a:prstGeom>
+        </p:spPr>
+        <p:txBody>
+          <a:bodyPr vert="horz" lIns="91440" tIns="45720" rIns="91440" bIns="45720" rtlCol="0" anchor="ctr">
+            <a:noAutofit/>
+          </a:bodyPr>
+          <a:lstStyle>
+            <a:defPPr>
+              <a:defRPr lang="fr-FR"/>
+            </a:defPPr>
+            <a:lvl1pPr algn="ctr">
+              <a:spcBef>
+                <a:spcPct val="0"/>
+              </a:spcBef>
+              <a:buNone/>
+              <a:defRPr sz="7200">
+                <a:latin typeface="+mj-lt"/>
+                <a:ea typeface="+mj-ea"/>
+                <a:cs typeface="+mj-cs"/>
+              </a:defRPr>
+            </a:lvl1pPr>
+          </a:lstStyle>
+          <a:p>
+            <a:r>
+              <a:rPr lang="fr-FR" dirty="0" err="1"/>
+              <a:t>Niv</a:t>
+            </a:r>
+            <a:r>
+              <a:rPr lang="fr-FR" dirty="0"/>
+              <a:t> 6</a:t>
+            </a:r>
+          </a:p>
+        </p:txBody>
+      </p:sp>
+      <p:sp>
+        <p:nvSpPr>
+          <p:cNvPr id="7" name="Titre 1"/>
+          <p:cNvSpPr txBox="1">
+            <a:spLocks/>
+          </p:cNvSpPr>
+          <p:nvPr/>
+        </p:nvSpPr>
+        <p:spPr>
+          <a:xfrm>
+            <a:off x="4572000" y="4725144"/>
+            <a:ext cx="4464496" cy="1800200"/>
+          </a:xfrm>
+          <a:prstGeom prst="rect">
+            <a:avLst/>
+          </a:prstGeom>
+        </p:spPr>
+        <p:txBody>
+          <a:bodyPr vert="horz" lIns="91440" tIns="45720" rIns="91440" bIns="45720" rtlCol="0" anchor="ctr">
+            <a:noAutofit/>
+          </a:bodyPr>
+          <a:lstStyle>
+            <a:defPPr>
+              <a:defRPr lang="fr-FR"/>
+            </a:defPPr>
+            <a:lvl1pPr algn="ctr">
+              <a:spcBef>
+                <a:spcPct val="0"/>
+              </a:spcBef>
+              <a:buNone/>
+              <a:defRPr sz="7200">
+                <a:latin typeface="+mj-lt"/>
+                <a:ea typeface="+mj-ea"/>
+                <a:cs typeface="+mj-cs"/>
+              </a:defRPr>
+            </a:lvl1pPr>
+          </a:lstStyle>
+          <a:p>
+            <a:r>
+              <a:rPr lang="fr-FR" sz="5400" dirty="0" smtClean="0"/>
+              <a:t>Stocke 2 actions</a:t>
+            </a:r>
+            <a:endParaRPr lang="fr-FR" sz="5400" dirty="0"/>
+          </a:p>
+        </p:txBody>
+      </p:sp>
+      <p:sp>
+        <p:nvSpPr>
+          <p:cNvPr id="8" name="Titre 1"/>
+          <p:cNvSpPr txBox="1">
+            <a:spLocks/>
+          </p:cNvSpPr>
+          <p:nvPr/>
+        </p:nvSpPr>
+        <p:spPr>
+          <a:xfrm>
+            <a:off x="7604720" y="413048"/>
+            <a:ext cx="1368152" cy="648072"/>
+          </a:xfrm>
+          <a:prstGeom prst="rect">
+            <a:avLst/>
+          </a:prstGeom>
+        </p:spPr>
+        <p:txBody>
+          <a:bodyPr vert="horz" lIns="91440" tIns="45720" rIns="91440" bIns="45720" rtlCol="0" anchor="ctr">
+            <a:noAutofit/>
+          </a:bodyPr>
+          <a:lstStyle>
+            <a:lvl1pPr algn="ctr">
+              <a:spcBef>
+                <a:spcPct val="0"/>
+              </a:spcBef>
+              <a:buNone/>
+              <a:defRPr sz="7200">
+                <a:latin typeface="+mj-lt"/>
+                <a:ea typeface="+mj-ea"/>
+                <a:cs typeface="+mj-cs"/>
+              </a:defRPr>
+            </a:lvl1pPr>
+          </a:lstStyle>
+          <a:p>
+            <a:r>
+              <a:rPr lang="fr-FR" dirty="0" smtClean="0"/>
+              <a:t>-</a:t>
+            </a:r>
+            <a:endParaRPr lang="fr-FR" dirty="0"/>
+          </a:p>
+        </p:txBody>
+      </p:sp>
+    </p:spTree>
+    <p:extLst>
+      <p:ext uri="{BB962C8B-B14F-4D97-AF65-F5344CB8AC3E}">
+        <p14:creationId xmlns:p14="http://schemas.microsoft.com/office/powerpoint/2010/main" val="38543887"/>
+      </p:ext>
+    </p:extLst>
+  </p:cSld>
+  <p:clrMapOvr>
+    <a:masterClrMapping/>
+  </p:clrMapOvr>
+  <p:timing>
+    <p:tnLst>
+      <p:par>
+        <p:cTn id="1" dur="indefinite" restart="never" nodeType="tmRoot"/>
+      </p:par>
+    </p:tnLst>
+  </p:timing>
+</p:sld>
+</file>
+
+<file path=ppt/slides/slide15.xml><?xml version="1.0" encoding="utf-8"?>
+<p:sld xmlns:a="http://schemas.openxmlformats.org/drawingml/2006/main" xmlns:r="http://schemas.openxmlformats.org/officeDocument/2006/relationships" xmlns:p="http://schemas.openxmlformats.org/presentationml/2006/main">
+  <p:cSld>
+    <p:spTree>
+      <p:nvGrpSpPr>
+        <p:cNvPr id="1" name=""/>
+        <p:cNvGrpSpPr/>
+        <p:nvPr/>
+      </p:nvGrpSpPr>
+      <p:grpSpPr>
+        <a:xfrm>
+          <a:off x="0" y="0"/>
+          <a:ext cx="0" cy="0"/>
+          <a:chOff x="0" y="0"/>
+          <a:chExt cx="0" cy="0"/>
+        </a:xfrm>
+      </p:grpSpPr>
+      <p:sp>
+        <p:nvSpPr>
+          <p:cNvPr id="6" name="Rectangle 5"/>
+          <p:cNvSpPr/>
+          <p:nvPr/>
+        </p:nvSpPr>
+        <p:spPr>
+          <a:xfrm>
+            <a:off x="0" y="0"/>
+            <a:ext cx="9144000" cy="6858000"/>
+          </a:xfrm>
+          <a:prstGeom prst="rect">
+            <a:avLst/>
+          </a:prstGeom>
+          <a:solidFill>
+            <a:srgbClr val="FFC000">
+              <a:alpha val="0"/>
+            </a:srgbClr>
+          </a:solidFill>
+          <a:ln w="101600">
+            <a:solidFill>
+              <a:schemeClr val="tx1"/>
+            </a:solidFill>
+          </a:ln>
+        </p:spPr>
+        <p:style>
+          <a:lnRef idx="2">
+            <a:schemeClr val="accent1">
+              <a:shade val="50000"/>
+            </a:schemeClr>
+          </a:lnRef>
+          <a:fillRef idx="1">
+            <a:schemeClr val="accent1"/>
+          </a:fillRef>
+          <a:effectRef idx="0">
+            <a:schemeClr val="accent1"/>
+          </a:effectRef>
+          <a:fontRef idx="minor">
+            <a:schemeClr val="lt1"/>
+          </a:fontRef>
+        </p:style>
+        <p:txBody>
+          <a:bodyPr rtlCol="0" anchor="ctr"/>
+          <a:lstStyle/>
+          <a:p>
+            <a:pPr algn="ctr"/>
+            <a:endParaRPr lang="fr-FR">
+              <a:solidFill>
+                <a:srgbClr val="FFC000"/>
+              </a:solidFill>
+            </a:endParaRPr>
+          </a:p>
+        </p:txBody>
+      </p:sp>
+      <p:sp>
+        <p:nvSpPr>
+          <p:cNvPr id="2" name="Titre 1"/>
+          <p:cNvSpPr>
+            <a:spLocks noGrp="1"/>
+          </p:cNvSpPr>
+          <p:nvPr>
+            <p:ph type="ctrTitle"/>
+          </p:nvPr>
+        </p:nvSpPr>
+        <p:spPr>
+          <a:xfrm>
+            <a:off x="323528" y="332656"/>
+            <a:ext cx="2304256" cy="936104"/>
+          </a:xfrm>
+        </p:spPr>
+        <p:txBody>
+          <a:bodyPr>
+            <a:noAutofit/>
+          </a:bodyPr>
+          <a:lstStyle/>
+          <a:p>
+            <a:r>
+              <a:rPr lang="fr-FR" sz="7200" dirty="0" smtClean="0"/>
+              <a:t>-</a:t>
+            </a:r>
+            <a:endParaRPr lang="fr-FR" sz="7200" dirty="0"/>
+          </a:p>
+        </p:txBody>
+      </p:sp>
+      <p:sp>
+        <p:nvSpPr>
+          <p:cNvPr id="3" name="Sous-titre 2"/>
+          <p:cNvSpPr>
+            <a:spLocks noGrp="1"/>
+          </p:cNvSpPr>
+          <p:nvPr>
+            <p:ph type="subTitle" idx="1"/>
+          </p:nvPr>
+        </p:nvSpPr>
+        <p:spPr>
+          <a:xfrm>
+            <a:off x="1907704" y="2744924"/>
+            <a:ext cx="4856584" cy="1368152"/>
+          </a:xfrm>
+        </p:spPr>
+        <p:txBody>
+          <a:bodyPr>
+            <a:normAutofit fontScale="62500" lnSpcReduction="20000"/>
+          </a:bodyPr>
+          <a:lstStyle/>
+          <a:p>
+            <a:r>
+              <a:rPr lang="fr-FR" sz="8000" dirty="0">
+                <a:solidFill>
+                  <a:schemeClr val="tx1"/>
+                </a:solidFill>
+              </a:rPr>
+              <a:t>Lapin de garenne</a:t>
+            </a:r>
+          </a:p>
+        </p:txBody>
+      </p:sp>
+      <p:sp>
+        <p:nvSpPr>
+          <p:cNvPr id="4" name="Titre 1"/>
+          <p:cNvSpPr txBox="1">
+            <a:spLocks/>
+          </p:cNvSpPr>
+          <p:nvPr/>
+        </p:nvSpPr>
+        <p:spPr>
+          <a:xfrm>
+            <a:off x="7452320" y="260648"/>
+            <a:ext cx="1368152" cy="648072"/>
+          </a:xfrm>
+          <a:prstGeom prst="rect">
+            <a:avLst/>
+          </a:prstGeom>
+        </p:spPr>
+        <p:txBody>
+          <a:bodyPr vert="horz" lIns="91440" tIns="45720" rIns="91440" bIns="45720" rtlCol="0" anchor="ctr">
+            <a:noAutofit/>
+          </a:bodyPr>
+          <a:lstStyle>
+            <a:lvl1pPr algn="ctr">
+              <a:spcBef>
+                <a:spcPct val="0"/>
+              </a:spcBef>
+              <a:buNone/>
+              <a:defRPr sz="7200">
+                <a:latin typeface="+mj-lt"/>
+                <a:ea typeface="+mj-ea"/>
+                <a:cs typeface="+mj-cs"/>
+              </a:defRPr>
+            </a:lvl1pPr>
+          </a:lstStyle>
+          <a:p>
+            <a:endParaRPr lang="fr-FR" dirty="0"/>
+          </a:p>
+        </p:txBody>
+      </p:sp>
+      <p:sp>
+        <p:nvSpPr>
+          <p:cNvPr id="5" name="Titre 1"/>
+          <p:cNvSpPr txBox="1">
+            <a:spLocks/>
+          </p:cNvSpPr>
+          <p:nvPr/>
+        </p:nvSpPr>
+        <p:spPr>
+          <a:xfrm>
+            <a:off x="467544" y="5805264"/>
+            <a:ext cx="2103218" cy="648072"/>
+          </a:xfrm>
+          <a:prstGeom prst="rect">
+            <a:avLst/>
+          </a:prstGeom>
+        </p:spPr>
+        <p:txBody>
+          <a:bodyPr vert="horz" lIns="91440" tIns="45720" rIns="91440" bIns="45720" rtlCol="0" anchor="ctr">
+            <a:noAutofit/>
+          </a:bodyPr>
+          <a:lstStyle>
+            <a:defPPr>
+              <a:defRPr lang="fr-FR"/>
+            </a:defPPr>
+            <a:lvl1pPr algn="ctr">
+              <a:spcBef>
+                <a:spcPct val="0"/>
+              </a:spcBef>
+              <a:buNone/>
+              <a:defRPr sz="7200">
+                <a:latin typeface="+mj-lt"/>
+                <a:ea typeface="+mj-ea"/>
+                <a:cs typeface="+mj-cs"/>
+              </a:defRPr>
+            </a:lvl1pPr>
+          </a:lstStyle>
+          <a:p>
+            <a:r>
+              <a:rPr lang="fr-FR" dirty="0" err="1"/>
+              <a:t>Niv</a:t>
+            </a:r>
+            <a:r>
+              <a:rPr lang="fr-FR" dirty="0"/>
+              <a:t> 6</a:t>
+            </a:r>
+          </a:p>
+        </p:txBody>
+      </p:sp>
+      <p:sp>
+        <p:nvSpPr>
+          <p:cNvPr id="7" name="Titre 1"/>
+          <p:cNvSpPr txBox="1">
+            <a:spLocks/>
+          </p:cNvSpPr>
+          <p:nvPr/>
+        </p:nvSpPr>
+        <p:spPr>
+          <a:xfrm>
+            <a:off x="4572000" y="4725144"/>
+            <a:ext cx="4464496" cy="1800200"/>
+          </a:xfrm>
+          <a:prstGeom prst="rect">
+            <a:avLst/>
+          </a:prstGeom>
+        </p:spPr>
+        <p:txBody>
+          <a:bodyPr vert="horz" lIns="91440" tIns="45720" rIns="91440" bIns="45720" rtlCol="0" anchor="ctr">
+            <a:noAutofit/>
+          </a:bodyPr>
+          <a:lstStyle>
+            <a:defPPr>
+              <a:defRPr lang="fr-FR"/>
+            </a:defPPr>
+            <a:lvl1pPr algn="ctr">
+              <a:spcBef>
+                <a:spcPct val="0"/>
+              </a:spcBef>
+              <a:buNone/>
+              <a:defRPr sz="7200">
+                <a:latin typeface="+mj-lt"/>
+                <a:ea typeface="+mj-ea"/>
+                <a:cs typeface="+mj-cs"/>
+              </a:defRPr>
+            </a:lvl1pPr>
+          </a:lstStyle>
+          <a:p>
+            <a:r>
+              <a:rPr lang="fr-FR" sz="5400" dirty="0" smtClean="0"/>
+              <a:t>Stocke 2 actions</a:t>
+            </a:r>
+            <a:endParaRPr lang="fr-FR" sz="5400" dirty="0"/>
+          </a:p>
+        </p:txBody>
+      </p:sp>
+      <p:sp>
+        <p:nvSpPr>
+          <p:cNvPr id="8" name="Titre 1"/>
+          <p:cNvSpPr txBox="1">
+            <a:spLocks/>
+          </p:cNvSpPr>
+          <p:nvPr/>
+        </p:nvSpPr>
+        <p:spPr>
+          <a:xfrm>
+            <a:off x="7604720" y="413048"/>
+            <a:ext cx="1368152" cy="648072"/>
+          </a:xfrm>
+          <a:prstGeom prst="rect">
+            <a:avLst/>
+          </a:prstGeom>
+        </p:spPr>
+        <p:txBody>
+          <a:bodyPr vert="horz" lIns="91440" tIns="45720" rIns="91440" bIns="45720" rtlCol="0" anchor="ctr">
+            <a:noAutofit/>
+          </a:bodyPr>
+          <a:lstStyle>
+            <a:lvl1pPr algn="ctr">
+              <a:spcBef>
+                <a:spcPct val="0"/>
+              </a:spcBef>
+              <a:buNone/>
+              <a:defRPr sz="7200">
+                <a:latin typeface="+mj-lt"/>
+                <a:ea typeface="+mj-ea"/>
+                <a:cs typeface="+mj-cs"/>
+              </a:defRPr>
+            </a:lvl1pPr>
+          </a:lstStyle>
+          <a:p>
+            <a:r>
+              <a:rPr lang="fr-FR" dirty="0" smtClean="0"/>
+              <a:t>-</a:t>
+            </a:r>
+            <a:endParaRPr lang="fr-FR" dirty="0"/>
+          </a:p>
+        </p:txBody>
+      </p:sp>
+    </p:spTree>
+    <p:extLst>
+      <p:ext uri="{BB962C8B-B14F-4D97-AF65-F5344CB8AC3E}">
+        <p14:creationId xmlns:p14="http://schemas.microsoft.com/office/powerpoint/2010/main" val="1342429770"/>
+      </p:ext>
+    </p:extLst>
+  </p:cSld>
+  <p:clrMapOvr>
+    <a:masterClrMapping/>
+  </p:clrMapOvr>
+  <p:timing>
+    <p:tnLst>
+      <p:par>
+        <p:cTn id="1" dur="indefinite" restart="never" nodeType="tmRoot"/>
+      </p:par>
+    </p:tnLst>
+  </p:timing>
+</p:sld>
+</file>
+
+<file path=ppt/slides/slide16.xml><?xml version="1.0" encoding="utf-8"?>
+<p:sld xmlns:a="http://schemas.openxmlformats.org/drawingml/2006/main" xmlns:r="http://schemas.openxmlformats.org/officeDocument/2006/relationships" xmlns:p="http://schemas.openxmlformats.org/presentationml/2006/main">
+  <p:cSld>
+    <p:spTree>
+      <p:nvGrpSpPr>
+        <p:cNvPr id="1" name=""/>
+        <p:cNvGrpSpPr/>
+        <p:nvPr/>
+      </p:nvGrpSpPr>
+      <p:grpSpPr>
+        <a:xfrm>
+          <a:off x="0" y="0"/>
+          <a:ext cx="0" cy="0"/>
+          <a:chOff x="0" y="0"/>
+          <a:chExt cx="0" cy="0"/>
+        </a:xfrm>
+      </p:grpSpPr>
+      <p:sp>
+        <p:nvSpPr>
+          <p:cNvPr id="6" name="Rectangle 5"/>
+          <p:cNvSpPr/>
+          <p:nvPr/>
+        </p:nvSpPr>
+        <p:spPr>
+          <a:xfrm>
+            <a:off x="0" y="0"/>
+            <a:ext cx="9144000" cy="6858000"/>
+          </a:xfrm>
+          <a:prstGeom prst="rect">
+            <a:avLst/>
+          </a:prstGeom>
+          <a:solidFill>
+            <a:srgbClr val="FFC000">
+              <a:alpha val="0"/>
+            </a:srgbClr>
+          </a:solidFill>
+          <a:ln w="101600">
+            <a:solidFill>
+              <a:schemeClr val="tx1"/>
+            </a:solidFill>
+          </a:ln>
+        </p:spPr>
+        <p:style>
+          <a:lnRef idx="2">
+            <a:schemeClr val="accent1">
+              <a:shade val="50000"/>
+            </a:schemeClr>
+          </a:lnRef>
+          <a:fillRef idx="1">
+            <a:schemeClr val="accent1"/>
+          </a:fillRef>
+          <a:effectRef idx="0">
+            <a:schemeClr val="accent1"/>
+          </a:effectRef>
+          <a:fontRef idx="minor">
+            <a:schemeClr val="lt1"/>
+          </a:fontRef>
+        </p:style>
+        <p:txBody>
+          <a:bodyPr rtlCol="0" anchor="ctr"/>
+          <a:lstStyle/>
+          <a:p>
+            <a:pPr algn="ctr"/>
+            <a:endParaRPr lang="fr-FR">
+              <a:solidFill>
+                <a:srgbClr val="FFC000"/>
+              </a:solidFill>
+            </a:endParaRPr>
+          </a:p>
+        </p:txBody>
+      </p:sp>
+      <p:sp>
+        <p:nvSpPr>
+          <p:cNvPr id="2" name="Titre 1"/>
+          <p:cNvSpPr>
+            <a:spLocks noGrp="1"/>
+          </p:cNvSpPr>
+          <p:nvPr>
+            <p:ph type="ctrTitle"/>
+          </p:nvPr>
+        </p:nvSpPr>
+        <p:spPr>
+          <a:xfrm>
+            <a:off x="323528" y="332656"/>
+            <a:ext cx="2304256" cy="936104"/>
+          </a:xfrm>
+        </p:spPr>
+        <p:txBody>
+          <a:bodyPr>
+            <a:noAutofit/>
+          </a:bodyPr>
+          <a:lstStyle/>
+          <a:p>
+            <a:r>
+              <a:rPr lang="fr-FR" sz="7200" dirty="0" smtClean="0"/>
+              <a:t>-</a:t>
+            </a:r>
+            <a:endParaRPr lang="fr-FR" sz="7200" dirty="0"/>
+          </a:p>
+        </p:txBody>
+      </p:sp>
+      <p:sp>
+        <p:nvSpPr>
+          <p:cNvPr id="3" name="Sous-titre 2"/>
+          <p:cNvSpPr>
+            <a:spLocks noGrp="1"/>
+          </p:cNvSpPr>
+          <p:nvPr>
+            <p:ph type="subTitle" idx="1"/>
+          </p:nvPr>
+        </p:nvSpPr>
+        <p:spPr>
+          <a:xfrm>
+            <a:off x="1907704" y="2744924"/>
+            <a:ext cx="4856584" cy="1368152"/>
+          </a:xfrm>
+        </p:spPr>
+        <p:txBody>
+          <a:bodyPr>
+            <a:normAutofit fontScale="62500" lnSpcReduction="20000"/>
+          </a:bodyPr>
+          <a:lstStyle/>
+          <a:p>
+            <a:r>
+              <a:rPr lang="fr-FR" sz="8000" dirty="0" err="1">
+                <a:solidFill>
+                  <a:schemeClr val="tx1"/>
+                </a:solidFill>
+              </a:rPr>
+              <a:t>Phagnalon</a:t>
+            </a:r>
+            <a:r>
+              <a:rPr lang="fr-FR" sz="8000" dirty="0">
+                <a:solidFill>
+                  <a:schemeClr val="tx1"/>
+                </a:solidFill>
+              </a:rPr>
+              <a:t> des rochers</a:t>
+            </a:r>
+          </a:p>
+        </p:txBody>
+      </p:sp>
+      <p:sp>
+        <p:nvSpPr>
+          <p:cNvPr id="4" name="Titre 1"/>
+          <p:cNvSpPr txBox="1">
+            <a:spLocks/>
+          </p:cNvSpPr>
+          <p:nvPr/>
+        </p:nvSpPr>
+        <p:spPr>
+          <a:xfrm>
+            <a:off x="7452320" y="260648"/>
+            <a:ext cx="1368152" cy="648072"/>
+          </a:xfrm>
+          <a:prstGeom prst="rect">
+            <a:avLst/>
+          </a:prstGeom>
+        </p:spPr>
+        <p:txBody>
+          <a:bodyPr vert="horz" lIns="91440" tIns="45720" rIns="91440" bIns="45720" rtlCol="0" anchor="ctr">
+            <a:noAutofit/>
+          </a:bodyPr>
+          <a:lstStyle>
+            <a:lvl1pPr algn="ctr">
+              <a:spcBef>
+                <a:spcPct val="0"/>
+              </a:spcBef>
+              <a:buNone/>
+              <a:defRPr sz="7200">
+                <a:latin typeface="+mj-lt"/>
+                <a:ea typeface="+mj-ea"/>
+                <a:cs typeface="+mj-cs"/>
+              </a:defRPr>
+            </a:lvl1pPr>
+          </a:lstStyle>
+          <a:p>
+            <a:endParaRPr lang="fr-FR" dirty="0"/>
+          </a:p>
+        </p:txBody>
+      </p:sp>
+      <p:sp>
+        <p:nvSpPr>
+          <p:cNvPr id="5" name="Titre 1"/>
+          <p:cNvSpPr txBox="1">
+            <a:spLocks/>
+          </p:cNvSpPr>
+          <p:nvPr/>
+        </p:nvSpPr>
+        <p:spPr>
+          <a:xfrm>
+            <a:off x="467544" y="5472288"/>
+            <a:ext cx="3888432" cy="648072"/>
+          </a:xfrm>
+          <a:prstGeom prst="rect">
+            <a:avLst/>
+          </a:prstGeom>
+        </p:spPr>
+        <p:txBody>
+          <a:bodyPr vert="horz" lIns="91440" tIns="45720" rIns="91440" bIns="45720" rtlCol="0" anchor="ctr">
+            <a:noAutofit/>
+          </a:bodyPr>
+          <a:lstStyle>
+            <a:defPPr>
+              <a:defRPr lang="fr-FR"/>
+            </a:defPPr>
+            <a:lvl1pPr algn="ctr">
+              <a:spcBef>
+                <a:spcPct val="0"/>
+              </a:spcBef>
+              <a:buNone/>
+              <a:defRPr sz="7200">
+                <a:latin typeface="+mj-lt"/>
+                <a:ea typeface="+mj-ea"/>
+                <a:cs typeface="+mj-cs"/>
+              </a:defRPr>
+            </a:lvl1pPr>
+          </a:lstStyle>
+          <a:p>
+            <a:r>
+              <a:rPr lang="fr-FR" sz="4800" dirty="0" smtClean="0"/>
+              <a:t>Niveau de la carte protégé</a:t>
+            </a:r>
+            <a:endParaRPr lang="fr-FR" sz="4800" dirty="0"/>
+          </a:p>
+        </p:txBody>
+      </p:sp>
+      <p:sp>
+        <p:nvSpPr>
+          <p:cNvPr id="7" name="Titre 1"/>
+          <p:cNvSpPr txBox="1">
+            <a:spLocks/>
+          </p:cNvSpPr>
+          <p:nvPr/>
+        </p:nvSpPr>
+        <p:spPr>
+          <a:xfrm>
+            <a:off x="4572000" y="4725144"/>
+            <a:ext cx="4464496" cy="1800200"/>
+          </a:xfrm>
+          <a:prstGeom prst="rect">
+            <a:avLst/>
+          </a:prstGeom>
+        </p:spPr>
+        <p:txBody>
+          <a:bodyPr vert="horz" lIns="91440" tIns="45720" rIns="91440" bIns="45720" rtlCol="0" anchor="ctr">
+            <a:noAutofit/>
+          </a:bodyPr>
+          <a:lstStyle>
+            <a:defPPr>
+              <a:defRPr lang="fr-FR"/>
+            </a:defPPr>
+            <a:lvl1pPr algn="ctr">
+              <a:spcBef>
+                <a:spcPct val="0"/>
+              </a:spcBef>
+              <a:buNone/>
+              <a:defRPr sz="7200">
+                <a:latin typeface="+mj-lt"/>
+                <a:ea typeface="+mj-ea"/>
+                <a:cs typeface="+mj-cs"/>
+              </a:defRPr>
+            </a:lvl1pPr>
+          </a:lstStyle>
+          <a:p>
+            <a:r>
+              <a:rPr lang="fr-FR" sz="5400" dirty="0" smtClean="0"/>
+              <a:t>Protège du vol</a:t>
+            </a:r>
+            <a:endParaRPr lang="fr-FR" sz="5400" dirty="0"/>
+          </a:p>
+        </p:txBody>
+      </p:sp>
+      <p:sp>
+        <p:nvSpPr>
+          <p:cNvPr id="8" name="Titre 1"/>
+          <p:cNvSpPr txBox="1">
+            <a:spLocks/>
+          </p:cNvSpPr>
+          <p:nvPr/>
+        </p:nvSpPr>
+        <p:spPr>
+          <a:xfrm>
+            <a:off x="7604720" y="413048"/>
+            <a:ext cx="1368152" cy="648072"/>
+          </a:xfrm>
+          <a:prstGeom prst="rect">
+            <a:avLst/>
+          </a:prstGeom>
+        </p:spPr>
+        <p:txBody>
+          <a:bodyPr vert="horz" lIns="91440" tIns="45720" rIns="91440" bIns="45720" rtlCol="0" anchor="ctr">
+            <a:noAutofit/>
+          </a:bodyPr>
+          <a:lstStyle>
+            <a:lvl1pPr algn="ctr">
+              <a:spcBef>
+                <a:spcPct val="0"/>
+              </a:spcBef>
+              <a:buNone/>
+              <a:defRPr sz="7200">
+                <a:latin typeface="+mj-lt"/>
+                <a:ea typeface="+mj-ea"/>
+                <a:cs typeface="+mj-cs"/>
+              </a:defRPr>
+            </a:lvl1pPr>
+          </a:lstStyle>
+          <a:p>
+            <a:r>
+              <a:rPr lang="fr-FR" dirty="0" smtClean="0"/>
+              <a:t>-</a:t>
+            </a:r>
+            <a:endParaRPr lang="fr-FR" dirty="0"/>
+          </a:p>
+        </p:txBody>
+      </p:sp>
+    </p:spTree>
+    <p:extLst>
+      <p:ext uri="{BB962C8B-B14F-4D97-AF65-F5344CB8AC3E}">
+        <p14:creationId xmlns:p14="http://schemas.microsoft.com/office/powerpoint/2010/main" val="1068469828"/>
+      </p:ext>
+    </p:extLst>
+  </p:cSld>
+  <p:clrMapOvr>
+    <a:masterClrMapping/>
+  </p:clrMapOvr>
+  <p:timing>
+    <p:tnLst>
+      <p:par>
+        <p:cTn id="1" dur="indefinite" restart="never" nodeType="tmRoot"/>
+      </p:par>
+    </p:tnLst>
+  </p:timing>
+</p:sld>
+</file>
+
+<file path=ppt/slides/slide17.xml><?xml version="1.0" encoding="utf-8"?>
+<p:sld xmlns:a="http://schemas.openxmlformats.org/drawingml/2006/main" xmlns:r="http://schemas.openxmlformats.org/officeDocument/2006/relationships" xmlns:p="http://schemas.openxmlformats.org/presentationml/2006/main">
+  <p:cSld>
+    <p:spTree>
+      <p:nvGrpSpPr>
+        <p:cNvPr id="1" name=""/>
+        <p:cNvGrpSpPr/>
+        <p:nvPr/>
+      </p:nvGrpSpPr>
+      <p:grpSpPr>
+        <a:xfrm>
+          <a:off x="0" y="0"/>
+          <a:ext cx="0" cy="0"/>
+          <a:chOff x="0" y="0"/>
+          <a:chExt cx="0" cy="0"/>
+        </a:xfrm>
+      </p:grpSpPr>
+      <p:sp>
+        <p:nvSpPr>
+          <p:cNvPr id="6" name="Rectangle 5"/>
+          <p:cNvSpPr/>
+          <p:nvPr/>
+        </p:nvSpPr>
+        <p:spPr>
+          <a:xfrm>
+            <a:off x="0" y="0"/>
+            <a:ext cx="9144000" cy="6858000"/>
+          </a:xfrm>
+          <a:prstGeom prst="rect">
+            <a:avLst/>
+          </a:prstGeom>
+          <a:solidFill>
+            <a:srgbClr val="FFC000">
+              <a:alpha val="0"/>
+            </a:srgbClr>
+          </a:solidFill>
+          <a:ln w="101600">
+            <a:solidFill>
+              <a:schemeClr val="tx1"/>
+            </a:solidFill>
+          </a:ln>
+        </p:spPr>
+        <p:style>
+          <a:lnRef idx="2">
+            <a:schemeClr val="accent1">
+              <a:shade val="50000"/>
+            </a:schemeClr>
+          </a:lnRef>
+          <a:fillRef idx="1">
+            <a:schemeClr val="accent1"/>
+          </a:fillRef>
+          <a:effectRef idx="0">
+            <a:schemeClr val="accent1"/>
+          </a:effectRef>
+          <a:fontRef idx="minor">
+            <a:schemeClr val="lt1"/>
+          </a:fontRef>
+        </p:style>
+        <p:txBody>
+          <a:bodyPr rtlCol="0" anchor="ctr"/>
+          <a:lstStyle/>
+          <a:p>
+            <a:pPr algn="ctr"/>
+            <a:endParaRPr lang="fr-FR">
+              <a:solidFill>
+                <a:srgbClr val="FFC000"/>
+              </a:solidFill>
+            </a:endParaRPr>
+          </a:p>
+        </p:txBody>
+      </p:sp>
+      <p:sp>
+        <p:nvSpPr>
+          <p:cNvPr id="2" name="Titre 1"/>
+          <p:cNvSpPr>
+            <a:spLocks noGrp="1"/>
+          </p:cNvSpPr>
+          <p:nvPr>
+            <p:ph type="ctrTitle"/>
+          </p:nvPr>
+        </p:nvSpPr>
+        <p:spPr>
+          <a:xfrm>
+            <a:off x="323528" y="332656"/>
+            <a:ext cx="2304256" cy="936104"/>
+          </a:xfrm>
+        </p:spPr>
+        <p:txBody>
+          <a:bodyPr>
+            <a:noAutofit/>
+          </a:bodyPr>
+          <a:lstStyle/>
+          <a:p>
+            <a:r>
+              <a:rPr lang="fr-FR" sz="7200" dirty="0" smtClean="0"/>
+              <a:t>-</a:t>
+            </a:r>
+            <a:endParaRPr lang="fr-FR" sz="7200" dirty="0"/>
+          </a:p>
+        </p:txBody>
+      </p:sp>
+      <p:sp>
+        <p:nvSpPr>
+          <p:cNvPr id="3" name="Sous-titre 2"/>
+          <p:cNvSpPr>
+            <a:spLocks noGrp="1"/>
+          </p:cNvSpPr>
+          <p:nvPr>
+            <p:ph type="subTitle" idx="1"/>
+          </p:nvPr>
+        </p:nvSpPr>
+        <p:spPr>
+          <a:xfrm>
+            <a:off x="1907704" y="2744924"/>
+            <a:ext cx="4856584" cy="1368152"/>
+          </a:xfrm>
+        </p:spPr>
+        <p:txBody>
+          <a:bodyPr>
+            <a:normAutofit fontScale="62500" lnSpcReduction="20000"/>
+          </a:bodyPr>
+          <a:lstStyle/>
+          <a:p>
+            <a:r>
+              <a:rPr lang="fr-FR" sz="8000" dirty="0" err="1">
+                <a:solidFill>
+                  <a:schemeClr val="tx1"/>
+                </a:solidFill>
+              </a:rPr>
+              <a:t>Phagnalon</a:t>
+            </a:r>
+            <a:r>
+              <a:rPr lang="fr-FR" sz="8000" dirty="0">
+                <a:solidFill>
+                  <a:schemeClr val="tx1"/>
+                </a:solidFill>
+              </a:rPr>
+              <a:t> des rochers</a:t>
+            </a:r>
+          </a:p>
+        </p:txBody>
+      </p:sp>
+      <p:sp>
+        <p:nvSpPr>
+          <p:cNvPr id="4" name="Titre 1"/>
+          <p:cNvSpPr txBox="1">
+            <a:spLocks/>
+          </p:cNvSpPr>
+          <p:nvPr/>
+        </p:nvSpPr>
+        <p:spPr>
+          <a:xfrm>
+            <a:off x="7452320" y="260648"/>
+            <a:ext cx="1368152" cy="648072"/>
+          </a:xfrm>
+          <a:prstGeom prst="rect">
+            <a:avLst/>
+          </a:prstGeom>
+        </p:spPr>
+        <p:txBody>
+          <a:bodyPr vert="horz" lIns="91440" tIns="45720" rIns="91440" bIns="45720" rtlCol="0" anchor="ctr">
+            <a:noAutofit/>
+          </a:bodyPr>
+          <a:lstStyle>
+            <a:lvl1pPr algn="ctr">
+              <a:spcBef>
+                <a:spcPct val="0"/>
+              </a:spcBef>
+              <a:buNone/>
+              <a:defRPr sz="7200">
+                <a:latin typeface="+mj-lt"/>
+                <a:ea typeface="+mj-ea"/>
+                <a:cs typeface="+mj-cs"/>
+              </a:defRPr>
+            </a:lvl1pPr>
+          </a:lstStyle>
+          <a:p>
+            <a:endParaRPr lang="fr-FR" dirty="0"/>
+          </a:p>
+        </p:txBody>
+      </p:sp>
+      <p:sp>
+        <p:nvSpPr>
+          <p:cNvPr id="5" name="Titre 1"/>
+          <p:cNvSpPr txBox="1">
+            <a:spLocks/>
+          </p:cNvSpPr>
+          <p:nvPr/>
+        </p:nvSpPr>
+        <p:spPr>
+          <a:xfrm>
+            <a:off x="467544" y="5472288"/>
+            <a:ext cx="3888432" cy="648072"/>
+          </a:xfrm>
+          <a:prstGeom prst="rect">
+            <a:avLst/>
+          </a:prstGeom>
+        </p:spPr>
+        <p:txBody>
+          <a:bodyPr vert="horz" lIns="91440" tIns="45720" rIns="91440" bIns="45720" rtlCol="0" anchor="ctr">
+            <a:noAutofit/>
+          </a:bodyPr>
+          <a:lstStyle>
+            <a:defPPr>
+              <a:defRPr lang="fr-FR"/>
+            </a:defPPr>
+            <a:lvl1pPr algn="ctr">
+              <a:spcBef>
+                <a:spcPct val="0"/>
+              </a:spcBef>
+              <a:buNone/>
+              <a:defRPr sz="7200">
+                <a:latin typeface="+mj-lt"/>
+                <a:ea typeface="+mj-ea"/>
+                <a:cs typeface="+mj-cs"/>
+              </a:defRPr>
+            </a:lvl1pPr>
+          </a:lstStyle>
+          <a:p>
+            <a:r>
+              <a:rPr lang="fr-FR" sz="4800" dirty="0" smtClean="0"/>
+              <a:t>Niveau de la carte protégé</a:t>
+            </a:r>
+            <a:endParaRPr lang="fr-FR" sz="4800" dirty="0"/>
+          </a:p>
+        </p:txBody>
+      </p:sp>
+      <p:sp>
+        <p:nvSpPr>
+          <p:cNvPr id="7" name="Titre 1"/>
+          <p:cNvSpPr txBox="1">
+            <a:spLocks/>
+          </p:cNvSpPr>
+          <p:nvPr/>
+        </p:nvSpPr>
+        <p:spPr>
+          <a:xfrm>
+            <a:off x="4572000" y="4725144"/>
+            <a:ext cx="4464496" cy="1800200"/>
+          </a:xfrm>
+          <a:prstGeom prst="rect">
+            <a:avLst/>
+          </a:prstGeom>
+        </p:spPr>
+        <p:txBody>
+          <a:bodyPr vert="horz" lIns="91440" tIns="45720" rIns="91440" bIns="45720" rtlCol="0" anchor="ctr">
+            <a:noAutofit/>
+          </a:bodyPr>
+          <a:lstStyle>
+            <a:defPPr>
+              <a:defRPr lang="fr-FR"/>
+            </a:defPPr>
+            <a:lvl1pPr algn="ctr">
+              <a:spcBef>
+                <a:spcPct val="0"/>
+              </a:spcBef>
+              <a:buNone/>
+              <a:defRPr sz="7200">
+                <a:latin typeface="+mj-lt"/>
+                <a:ea typeface="+mj-ea"/>
+                <a:cs typeface="+mj-cs"/>
+              </a:defRPr>
+            </a:lvl1pPr>
+          </a:lstStyle>
+          <a:p>
+            <a:r>
+              <a:rPr lang="fr-FR" sz="5400" dirty="0" smtClean="0"/>
+              <a:t>Protège du vol</a:t>
+            </a:r>
+            <a:endParaRPr lang="fr-FR" sz="5400" dirty="0"/>
+          </a:p>
+        </p:txBody>
+      </p:sp>
+      <p:sp>
+        <p:nvSpPr>
+          <p:cNvPr id="8" name="Titre 1"/>
+          <p:cNvSpPr txBox="1">
+            <a:spLocks/>
+          </p:cNvSpPr>
+          <p:nvPr/>
+        </p:nvSpPr>
+        <p:spPr>
+          <a:xfrm>
+            <a:off x="7604720" y="413048"/>
+            <a:ext cx="1368152" cy="648072"/>
+          </a:xfrm>
+          <a:prstGeom prst="rect">
+            <a:avLst/>
+          </a:prstGeom>
+        </p:spPr>
+        <p:txBody>
+          <a:bodyPr vert="horz" lIns="91440" tIns="45720" rIns="91440" bIns="45720" rtlCol="0" anchor="ctr">
+            <a:noAutofit/>
+          </a:bodyPr>
+          <a:lstStyle>
+            <a:lvl1pPr algn="ctr">
+              <a:spcBef>
+                <a:spcPct val="0"/>
+              </a:spcBef>
+              <a:buNone/>
+              <a:defRPr sz="7200">
+                <a:latin typeface="+mj-lt"/>
+                <a:ea typeface="+mj-ea"/>
+                <a:cs typeface="+mj-cs"/>
+              </a:defRPr>
+            </a:lvl1pPr>
+          </a:lstStyle>
+          <a:p>
+            <a:r>
+              <a:rPr lang="fr-FR" dirty="0" smtClean="0"/>
+              <a:t>-</a:t>
+            </a:r>
+            <a:endParaRPr lang="fr-FR" dirty="0"/>
+          </a:p>
+        </p:txBody>
+      </p:sp>
+    </p:spTree>
+    <p:extLst>
+      <p:ext uri="{BB962C8B-B14F-4D97-AF65-F5344CB8AC3E}">
+        <p14:creationId xmlns:p14="http://schemas.microsoft.com/office/powerpoint/2010/main" val="3967332060"/>
+      </p:ext>
+    </p:extLst>
+  </p:cSld>
+  <p:clrMapOvr>
+    <a:masterClrMapping/>
+  </p:clrMapOvr>
+  <p:timing>
+    <p:tnLst>
+      <p:par>
+        <p:cTn id="1" dur="indefinite" restart="never" nodeType="tmRoot"/>
+      </p:par>
+    </p:tnLst>
+  </p:timing>
+</p:sld>
+</file>
+
+<file path=ppt/slides/slide18.xml><?xml version="1.0" encoding="utf-8"?>
+<p:sld xmlns:a="http://schemas.openxmlformats.org/drawingml/2006/main" xmlns:r="http://schemas.openxmlformats.org/officeDocument/2006/relationships" xmlns:p="http://schemas.openxmlformats.org/presentationml/2006/main">
+  <p:cSld>
+    <p:spTree>
+      <p:nvGrpSpPr>
+        <p:cNvPr id="1" name=""/>
+        <p:cNvGrpSpPr/>
+        <p:nvPr/>
+      </p:nvGrpSpPr>
+      <p:grpSpPr>
+        <a:xfrm>
+          <a:off x="0" y="0"/>
+          <a:ext cx="0" cy="0"/>
+          <a:chOff x="0" y="0"/>
+          <a:chExt cx="0" cy="0"/>
+        </a:xfrm>
+      </p:grpSpPr>
+      <p:sp>
+        <p:nvSpPr>
+          <p:cNvPr id="6" name="Rectangle 5"/>
+          <p:cNvSpPr/>
+          <p:nvPr/>
+        </p:nvSpPr>
+        <p:spPr>
+          <a:xfrm>
+            <a:off x="0" y="0"/>
+            <a:ext cx="9144000" cy="6858000"/>
+          </a:xfrm>
+          <a:prstGeom prst="rect">
+            <a:avLst/>
+          </a:prstGeom>
+          <a:solidFill>
+            <a:srgbClr val="FFC000">
+              <a:alpha val="0"/>
+            </a:srgbClr>
+          </a:solidFill>
+          <a:ln w="101600">
+            <a:solidFill>
+              <a:schemeClr val="tx1"/>
+            </a:solidFill>
+          </a:ln>
+        </p:spPr>
+        <p:style>
+          <a:lnRef idx="2">
+            <a:schemeClr val="accent1">
+              <a:shade val="50000"/>
+            </a:schemeClr>
+          </a:lnRef>
+          <a:fillRef idx="1">
+            <a:schemeClr val="accent1"/>
+          </a:fillRef>
+          <a:effectRef idx="0">
+            <a:schemeClr val="accent1"/>
+          </a:effectRef>
+          <a:fontRef idx="minor">
+            <a:schemeClr val="lt1"/>
+          </a:fontRef>
+        </p:style>
+        <p:txBody>
+          <a:bodyPr rtlCol="0" anchor="ctr"/>
+          <a:lstStyle/>
+          <a:p>
+            <a:pPr algn="ctr"/>
+            <a:endParaRPr lang="fr-FR">
+              <a:solidFill>
+                <a:srgbClr val="FFC000"/>
+              </a:solidFill>
+            </a:endParaRPr>
+          </a:p>
+        </p:txBody>
+      </p:sp>
+      <p:sp>
+        <p:nvSpPr>
+          <p:cNvPr id="2" name="Titre 1"/>
+          <p:cNvSpPr>
+            <a:spLocks noGrp="1"/>
+          </p:cNvSpPr>
+          <p:nvPr>
+            <p:ph type="ctrTitle"/>
+          </p:nvPr>
+        </p:nvSpPr>
+        <p:spPr>
+          <a:xfrm>
+            <a:off x="323528" y="332656"/>
+            <a:ext cx="2304256" cy="936104"/>
+          </a:xfrm>
+        </p:spPr>
+        <p:txBody>
+          <a:bodyPr>
+            <a:noAutofit/>
+          </a:bodyPr>
+          <a:lstStyle/>
+          <a:p>
+            <a:r>
+              <a:rPr lang="fr-FR" sz="7200" dirty="0" smtClean="0"/>
+              <a:t>-</a:t>
+            </a:r>
+            <a:endParaRPr lang="fr-FR" sz="7200" dirty="0"/>
+          </a:p>
+        </p:txBody>
+      </p:sp>
+      <p:sp>
+        <p:nvSpPr>
+          <p:cNvPr id="3" name="Sous-titre 2"/>
+          <p:cNvSpPr>
+            <a:spLocks noGrp="1"/>
+          </p:cNvSpPr>
+          <p:nvPr>
+            <p:ph type="subTitle" idx="1"/>
+          </p:nvPr>
+        </p:nvSpPr>
+        <p:spPr>
+          <a:xfrm>
+            <a:off x="1907704" y="2744924"/>
+            <a:ext cx="4856584" cy="1368152"/>
+          </a:xfrm>
+        </p:spPr>
+        <p:txBody>
+          <a:bodyPr>
+            <a:normAutofit/>
+          </a:bodyPr>
+          <a:lstStyle/>
+          <a:p>
+            <a:r>
+              <a:rPr lang="fr-FR" sz="8000" dirty="0">
+                <a:solidFill>
+                  <a:schemeClr val="tx1"/>
+                </a:solidFill>
+              </a:rPr>
+              <a:t>Nerprun</a:t>
+            </a:r>
+          </a:p>
+        </p:txBody>
+      </p:sp>
+      <p:sp>
+        <p:nvSpPr>
+          <p:cNvPr id="4" name="Titre 1"/>
+          <p:cNvSpPr txBox="1">
+            <a:spLocks/>
+          </p:cNvSpPr>
+          <p:nvPr/>
+        </p:nvSpPr>
+        <p:spPr>
+          <a:xfrm>
+            <a:off x="7452320" y="260648"/>
+            <a:ext cx="1368152" cy="648072"/>
+          </a:xfrm>
+          <a:prstGeom prst="rect">
+            <a:avLst/>
+          </a:prstGeom>
+        </p:spPr>
+        <p:txBody>
+          <a:bodyPr vert="horz" lIns="91440" tIns="45720" rIns="91440" bIns="45720" rtlCol="0" anchor="ctr">
+            <a:noAutofit/>
+          </a:bodyPr>
+          <a:lstStyle>
+            <a:lvl1pPr algn="ctr">
+              <a:spcBef>
+                <a:spcPct val="0"/>
+              </a:spcBef>
+              <a:buNone/>
+              <a:defRPr sz="7200">
+                <a:latin typeface="+mj-lt"/>
+                <a:ea typeface="+mj-ea"/>
+                <a:cs typeface="+mj-cs"/>
+              </a:defRPr>
+            </a:lvl1pPr>
+          </a:lstStyle>
+          <a:p>
+            <a:endParaRPr lang="fr-FR" dirty="0"/>
+          </a:p>
+        </p:txBody>
+      </p:sp>
+      <p:sp>
+        <p:nvSpPr>
+          <p:cNvPr id="5" name="Titre 1"/>
+          <p:cNvSpPr txBox="1">
+            <a:spLocks/>
+          </p:cNvSpPr>
+          <p:nvPr/>
+        </p:nvSpPr>
+        <p:spPr>
+          <a:xfrm>
+            <a:off x="467544" y="5472288"/>
+            <a:ext cx="1800200" cy="648072"/>
+          </a:xfrm>
+          <a:prstGeom prst="rect">
+            <a:avLst/>
+          </a:prstGeom>
+        </p:spPr>
+        <p:txBody>
+          <a:bodyPr vert="horz" lIns="91440" tIns="45720" rIns="91440" bIns="45720" rtlCol="0" anchor="ctr">
+            <a:noAutofit/>
+          </a:bodyPr>
+          <a:lstStyle>
+            <a:defPPr>
+              <a:defRPr lang="fr-FR"/>
+            </a:defPPr>
+            <a:lvl1pPr algn="ctr">
+              <a:spcBef>
+                <a:spcPct val="0"/>
+              </a:spcBef>
+              <a:buNone/>
+              <a:defRPr sz="7200">
+                <a:latin typeface="+mj-lt"/>
+                <a:ea typeface="+mj-ea"/>
+                <a:cs typeface="+mj-cs"/>
+              </a:defRPr>
+            </a:lvl1pPr>
+          </a:lstStyle>
+          <a:p>
+            <a:r>
+              <a:rPr lang="fr-FR" sz="4800" dirty="0" err="1" smtClean="0"/>
+              <a:t>Niv</a:t>
+            </a:r>
+            <a:r>
+              <a:rPr lang="fr-FR" sz="4800" dirty="0" smtClean="0"/>
+              <a:t> 9</a:t>
+            </a:r>
+            <a:endParaRPr lang="fr-FR" sz="4800" dirty="0"/>
+          </a:p>
+        </p:txBody>
+      </p:sp>
+      <p:sp>
+        <p:nvSpPr>
+          <p:cNvPr id="7" name="Titre 1"/>
+          <p:cNvSpPr txBox="1">
+            <a:spLocks/>
+          </p:cNvSpPr>
+          <p:nvPr/>
+        </p:nvSpPr>
+        <p:spPr>
+          <a:xfrm>
+            <a:off x="4572000" y="4725144"/>
+            <a:ext cx="4464496" cy="1800200"/>
+          </a:xfrm>
+          <a:prstGeom prst="rect">
+            <a:avLst/>
+          </a:prstGeom>
+        </p:spPr>
+        <p:txBody>
+          <a:bodyPr vert="horz" lIns="91440" tIns="45720" rIns="91440" bIns="45720" rtlCol="0" anchor="ctr">
+            <a:noAutofit/>
+          </a:bodyPr>
+          <a:lstStyle>
+            <a:defPPr>
+              <a:defRPr lang="fr-FR"/>
+            </a:defPPr>
+            <a:lvl1pPr algn="ctr">
+              <a:spcBef>
+                <a:spcPct val="0"/>
+              </a:spcBef>
+              <a:buNone/>
+              <a:defRPr sz="7200">
+                <a:latin typeface="+mj-lt"/>
+                <a:ea typeface="+mj-ea"/>
+                <a:cs typeface="+mj-cs"/>
+              </a:defRPr>
+            </a:lvl1pPr>
+          </a:lstStyle>
+          <a:p>
+            <a:r>
+              <a:rPr lang="fr-FR" sz="4400" dirty="0" smtClean="0"/>
+              <a:t>Piocher une carte par At subie</a:t>
+            </a:r>
+            <a:endParaRPr lang="fr-FR" sz="4400" dirty="0"/>
+          </a:p>
+        </p:txBody>
+      </p:sp>
+      <p:sp>
+        <p:nvSpPr>
+          <p:cNvPr id="8" name="Titre 1"/>
+          <p:cNvSpPr txBox="1">
+            <a:spLocks/>
+          </p:cNvSpPr>
+          <p:nvPr/>
+        </p:nvSpPr>
+        <p:spPr>
+          <a:xfrm>
+            <a:off x="7604720" y="413048"/>
+            <a:ext cx="1368152" cy="648072"/>
+          </a:xfrm>
+          <a:prstGeom prst="rect">
+            <a:avLst/>
+          </a:prstGeom>
+        </p:spPr>
+        <p:txBody>
+          <a:bodyPr vert="horz" lIns="91440" tIns="45720" rIns="91440" bIns="45720" rtlCol="0" anchor="ctr">
+            <a:noAutofit/>
+          </a:bodyPr>
+          <a:lstStyle>
+            <a:lvl1pPr algn="ctr">
+              <a:spcBef>
+                <a:spcPct val="0"/>
+              </a:spcBef>
+              <a:buNone/>
+              <a:defRPr sz="7200">
+                <a:latin typeface="+mj-lt"/>
+                <a:ea typeface="+mj-ea"/>
+                <a:cs typeface="+mj-cs"/>
+              </a:defRPr>
+            </a:lvl1pPr>
+          </a:lstStyle>
+          <a:p>
+            <a:r>
+              <a:rPr lang="fr-FR" dirty="0" smtClean="0"/>
+              <a:t>-</a:t>
+            </a:r>
+            <a:endParaRPr lang="fr-FR" dirty="0"/>
+          </a:p>
+        </p:txBody>
+      </p:sp>
+    </p:spTree>
+    <p:extLst>
+      <p:ext uri="{BB962C8B-B14F-4D97-AF65-F5344CB8AC3E}">
+        <p14:creationId xmlns:p14="http://schemas.microsoft.com/office/powerpoint/2010/main" val="2002626027"/>
       </p:ext>
     </p:extLst>
   </p:cSld>
@@ -3859,7 +6969,7 @@
     </p:spTree>
     <p:extLst>
       <p:ext uri="{BB962C8B-B14F-4D97-AF65-F5344CB8AC3E}">
-        <p14:creationId xmlns:p14="http://schemas.microsoft.com/office/powerpoint/2010/main" val="3108208375"/>
+        <p14:creationId xmlns:p14="http://schemas.microsoft.com/office/powerpoint/2010/main" val="1655415922"/>
       </p:ext>
     </p:extLst>
   </p:cSld>
@@ -4005,7 +7115,7 @@
                   <a:schemeClr val="tx1"/>
                 </a:solidFill>
               </a:rPr>
-              <a:t>Immortel des dunes</a:t>
+              <a:t>Immortelle des dunes</a:t>
             </a:r>
             <a:endParaRPr lang="fr-FR" sz="8000" dirty="0">
               <a:solidFill>
@@ -4200,7 +7310,7 @@
     </p:spTree>
     <p:extLst>
       <p:ext uri="{BB962C8B-B14F-4D97-AF65-F5344CB8AC3E}">
-        <p14:creationId xmlns:p14="http://schemas.microsoft.com/office/powerpoint/2010/main" val="3656041607"/>
+        <p14:creationId xmlns:p14="http://schemas.microsoft.com/office/powerpoint/2010/main" val="38543887"/>
       </p:ext>
     </p:extLst>
   </p:cSld>
@@ -4341,12 +7451,20 @@
           <a:lstStyle/>
           <a:p>
             <a:r>
+              <a:rPr lang="fr-FR" sz="8000" dirty="0">
+                <a:solidFill>
+                  <a:schemeClr val="tx1"/>
+                </a:solidFill>
+              </a:rPr>
+              <a:t>Immortelle des </a:t>
+            </a:r>
+            <a:r>
               <a:rPr lang="fr-FR" sz="8000" dirty="0" smtClean="0">
                 <a:solidFill>
                   <a:schemeClr val="tx1"/>
                 </a:solidFill>
               </a:rPr>
-              <a:t>Immortel des dunes</a:t>
+              <a:t>dunes</a:t>
             </a:r>
             <a:endParaRPr lang="fr-FR" sz="8000" dirty="0">
               <a:solidFill>
@@ -4832,7 +7950,6 @@
               <a:rPr lang="fr-FR" dirty="0"/>
               <a:t>+2 PV</a:t>
             </a:r>
-            <a:endParaRPr lang="fr-FR" dirty="0"/>
           </a:p>
         </p:txBody>
       </p:sp>
@@ -4924,7 +8041,7 @@
         </p:nvSpPr>
         <p:spPr>
           <a:xfrm>
-            <a:off x="20751" y="0"/>
+            <a:off x="0" y="0"/>
             <a:ext cx="9144000" cy="6858000"/>
           </a:xfrm>
           <a:prstGeom prst="rect">
@@ -4994,7 +8111,7 @@
           <a:p>
             <a:r>
               <a:rPr lang="fr-FR" sz="7200" dirty="0" smtClean="0"/>
-              <a:t>A 0</a:t>
+              <a:t>-</a:t>
             </a:r>
             <a:endParaRPr lang="fr-FR" sz="7200" dirty="0"/>
           </a:p>
@@ -5018,7 +8135,7 @@
         </p:spPr>
         <p:txBody>
           <a:bodyPr>
-            <a:normAutofit/>
+            <a:normAutofit fontScale="62500" lnSpcReduction="20000"/>
           </a:bodyPr>
           <a:lstStyle/>
           <a:p>
@@ -5028,7 +8145,7 @@
                   <a:schemeClr val="tx1"/>
                 </a:solidFill>
               </a:rPr>
-              <a:t>Euphorbe</a:t>
+              <a:t>Lézard des muraille</a:t>
             </a:r>
             <a:endParaRPr lang="fr-FR" sz="8000" dirty="0">
               <a:solidFill>
@@ -5073,14 +8190,6 @@
             </a:lvl1pPr>
           </a:lstStyle>
           <a:p>
-            <a:r>
-              <a:rPr lang="fr-FR" dirty="0"/>
-              <a:t>S </a:t>
-            </a:r>
-            <a:r>
-              <a:rPr lang="fr-FR" dirty="0" smtClean="0"/>
-              <a:t>0</a:t>
-            </a:r>
             <a:endParaRPr lang="fr-FR" dirty="0"/>
           </a:p>
         </p:txBody>
@@ -5133,7 +8242,7 @@
             </a:r>
             <a:r>
               <a:rPr lang="fr-FR" dirty="0" smtClean="0"/>
-              <a:t>4</a:t>
+              <a:t>6</a:t>
             </a:r>
             <a:endParaRPr lang="fr-FR" dirty="0"/>
           </a:p>
@@ -5149,8 +8258,8 @@
         </p:nvSpPr>
         <p:spPr>
           <a:xfrm>
-            <a:off x="6228184" y="5877272"/>
-            <a:ext cx="2808312" cy="648072"/>
+            <a:off x="5076056" y="4905164"/>
+            <a:ext cx="4464496" cy="1800200"/>
           </a:xfrm>
           <a:prstGeom prst="rect">
             <a:avLst/>
@@ -5178,8 +8287,50 @@
           </a:lstStyle>
           <a:p>
             <a:r>
+              <a:rPr lang="fr-FR" dirty="0"/>
+              <a:t>+2 PV</a:t>
+            </a:r>
+          </a:p>
+        </p:txBody>
+      </p:sp>
+      <p:sp>
+        <p:nvSpPr>
+          <p:cNvPr id="8" name="Titre 1"/>
+          <p:cNvSpPr txBox="1">
+            <a:spLocks/>
+          </p:cNvSpPr>
+          <p:nvPr/>
+        </p:nvSpPr>
+        <p:spPr>
+          <a:xfrm>
+            <a:off x="7604720" y="413048"/>
+            <a:ext cx="1368152" cy="648072"/>
+          </a:xfrm>
+          <a:prstGeom prst="rect">
+            <a:avLst/>
+          </a:prstGeom>
+        </p:spPr>
+        <p:txBody>
+          <a:bodyPr vert="horz" lIns="91440" tIns="45720" rIns="91440" bIns="45720" rtlCol="0" anchor="ctr">
+            <a:noAutofit/>
+          </a:bodyPr>
+          <a:lstStyle>
+            <a:lvl1pPr algn="ctr">
+              <a:spcBef>
+                <a:spcPct val="0"/>
+              </a:spcBef>
+              <a:buNone/>
+              <a:defRPr sz="7200">
+                <a:latin typeface="+mj-lt"/>
+                <a:ea typeface="+mj-ea"/>
+                <a:cs typeface="+mj-cs"/>
+              </a:defRPr>
+            </a:lvl1pPr>
+          </a:lstStyle>
+          <a:p>
+            <a:r>
               <a:rPr lang="fr-FR" dirty="0" smtClean="0"/>
-              <a:t>- 1 PV </a:t>
+              <a:t>-</a:t>
             </a:r>
             <a:endParaRPr lang="fr-FR" dirty="0"/>
           </a:p>
@@ -5188,7 +8339,7 @@
     </p:spTree>
     <p:extLst>
       <p:ext uri="{BB962C8B-B14F-4D97-AF65-F5344CB8AC3E}">
-        <p14:creationId xmlns:p14="http://schemas.microsoft.com/office/powerpoint/2010/main" val="2419852552"/>
+        <p14:creationId xmlns:p14="http://schemas.microsoft.com/office/powerpoint/2010/main" val="1123019848"/>
       </p:ext>
     </p:extLst>
   </p:cSld>
@@ -5230,7 +8381,7 @@
         </p:nvSpPr>
         <p:spPr>
           <a:xfrm>
-            <a:off x="0" y="0"/>
+            <a:off x="20751" y="0"/>
             <a:ext cx="9144000" cy="6858000"/>
           </a:xfrm>
           <a:prstGeom prst="rect">
@@ -5300,7 +8451,7 @@
           <a:p>
             <a:r>
               <a:rPr lang="fr-FR" sz="7200" dirty="0" smtClean="0"/>
-              <a:t>-</a:t>
+              <a:t>A 0</a:t>
             </a:r>
             <a:endParaRPr lang="fr-FR" sz="7200" dirty="0"/>
           </a:p>
@@ -5323,37 +8474,18 @@
           </a:xfrm>
         </p:spPr>
         <p:txBody>
-          <a:bodyPr vert="horz" lIns="91440" tIns="45720" rIns="91440" bIns="45720" rtlCol="0" anchor="ctr">
-            <a:noAutofit/>
+          <a:bodyPr>
+            <a:normAutofit fontScale="62500" lnSpcReduction="20000"/>
           </a:bodyPr>
           <a:lstStyle/>
           <a:p>
-            <a:pPr>
-              <a:spcBef>
-                <a:spcPct val="0"/>
-              </a:spcBef>
-            </a:pPr>
-            <a:r>
-              <a:rPr lang="fr-FR" sz="7200" dirty="0" err="1">
+            <a:r>
+              <a:rPr lang="fr-FR" sz="8000" dirty="0">
                 <a:solidFill>
                   <a:schemeClr val="tx1"/>
                 </a:solidFill>
-                <a:latin typeface="+mj-lt"/>
-                <a:ea typeface="+mj-ea"/>
-                <a:cs typeface="+mj-cs"/>
               </a:rPr>
-              <a:t>Évax</a:t>
-            </a:r>
-            <a:r>
-              <a:rPr lang="fr-FR" sz="7200" dirty="0">
-                <a:solidFill>
-                  <a:schemeClr val="tx1"/>
-                </a:solidFill>
-                <a:latin typeface="+mj-lt"/>
-                <a:ea typeface="+mj-ea"/>
-                <a:cs typeface="+mj-cs"/>
-              </a:rPr>
-              <a:t> pygmée</a:t>
+              <a:t>Euphorbe des garrigues</a:t>
             </a:r>
           </a:p>
         </p:txBody>
@@ -5393,6 +8525,14 @@
             </a:lvl1pPr>
           </a:lstStyle>
           <a:p>
+            <a:r>
+              <a:rPr lang="fr-FR" dirty="0"/>
+              <a:t>S </a:t>
+            </a:r>
+            <a:r>
+              <a:rPr lang="fr-FR" dirty="0" smtClean="0"/>
+              <a:t>0</a:t>
+            </a:r>
             <a:endParaRPr lang="fr-FR" dirty="0"/>
           </a:p>
         </p:txBody>
@@ -5445,7 +8585,7 @@
             </a:r>
             <a:r>
               <a:rPr lang="fr-FR" dirty="0" smtClean="0"/>
-              <a:t>3</a:t>
+              <a:t>4</a:t>
             </a:r>
             <a:endParaRPr lang="fr-FR" dirty="0"/>
           </a:p>
@@ -5461,8 +8601,8 @@
         </p:nvSpPr>
         <p:spPr>
           <a:xfrm>
-            <a:off x="5076056" y="4905164"/>
-            <a:ext cx="3528392" cy="1800200"/>
+            <a:off x="6228184" y="5877272"/>
+            <a:ext cx="2808312" cy="648072"/>
           </a:xfrm>
           <a:prstGeom prst="rect">
             <a:avLst/>
@@ -5490,51 +8630,8 @@
           </a:lstStyle>
           <a:p>
             <a:r>
-              <a:rPr lang="fr-FR" dirty="0"/>
-              <a:t> -1 At </a:t>
-            </a:r>
-            <a:endParaRPr lang="fr-FR" dirty="0"/>
-          </a:p>
-        </p:txBody>
-      </p:sp>
-      <p:sp>
-        <p:nvSpPr>
-          <p:cNvPr id="8" name="Titre 1"/>
-          <p:cNvSpPr txBox="1">
-            <a:spLocks/>
-          </p:cNvSpPr>
-          <p:nvPr/>
-        </p:nvSpPr>
-        <p:spPr>
-          <a:xfrm>
-            <a:off x="7604720" y="413048"/>
-            <a:ext cx="1368152" cy="648072"/>
-          </a:xfrm>
-          <a:prstGeom prst="rect">
-            <a:avLst/>
-          </a:prstGeom>
-        </p:spPr>
-        <p:txBody>
-          <a:bodyPr vert="horz" lIns="91440" tIns="45720" rIns="91440" bIns="45720" rtlCol="0" anchor="ctr">
-            <a:noAutofit/>
-          </a:bodyPr>
-          <a:lstStyle>
-            <a:lvl1pPr algn="ctr">
-              <a:spcBef>
-                <a:spcPct val="0"/>
-              </a:spcBef>
-              <a:buNone/>
-              <a:defRPr sz="7200">
-                <a:latin typeface="+mj-lt"/>
-                <a:ea typeface="+mj-ea"/>
-                <a:cs typeface="+mj-cs"/>
-              </a:defRPr>
-            </a:lvl1pPr>
-          </a:lstStyle>
-          <a:p>
-            <a:r>
               <a:rPr lang="fr-FR" dirty="0" smtClean="0"/>
-              <a:t>-</a:t>
+              <a:t>- 1 PV </a:t>
             </a:r>
             <a:endParaRPr lang="fr-FR" dirty="0"/>
           </a:p>
@@ -5543,7 +8640,7 @@
     </p:spTree>
     <p:extLst>
       <p:ext uri="{BB962C8B-B14F-4D97-AF65-F5344CB8AC3E}">
-        <p14:creationId xmlns:p14="http://schemas.microsoft.com/office/powerpoint/2010/main" val="671990365"/>
+        <p14:creationId xmlns:p14="http://schemas.microsoft.com/office/powerpoint/2010/main" val="2419852552"/>
       </p:ext>
     </p:extLst>
   </p:cSld>
@@ -5585,7 +8682,7 @@
         </p:nvSpPr>
         <p:spPr>
           <a:xfrm>
-            <a:off x="0" y="0"/>
+            <a:off x="20751" y="0"/>
             <a:ext cx="9144000" cy="6858000"/>
           </a:xfrm>
           <a:prstGeom prst="rect">
@@ -5655,7 +8752,7 @@
           <a:p>
             <a:r>
               <a:rPr lang="fr-FR" sz="7200" dirty="0" smtClean="0"/>
-              <a:t>-</a:t>
+              <a:t>A 0</a:t>
             </a:r>
             <a:endParaRPr lang="fr-FR" sz="7200" dirty="0"/>
           </a:p>
@@ -5678,37 +8775,18 @@
           </a:xfrm>
         </p:spPr>
         <p:txBody>
-          <a:bodyPr vert="horz" lIns="91440" tIns="45720" rIns="91440" bIns="45720" rtlCol="0" anchor="ctr">
-            <a:noAutofit/>
+          <a:bodyPr>
+            <a:normAutofit fontScale="62500" lnSpcReduction="20000"/>
           </a:bodyPr>
           <a:lstStyle/>
           <a:p>
-            <a:pPr>
-              <a:spcBef>
-                <a:spcPct val="0"/>
-              </a:spcBef>
-            </a:pPr>
-            <a:r>
-              <a:rPr lang="fr-FR" sz="7200" dirty="0" err="1">
+            <a:r>
+              <a:rPr lang="fr-FR" sz="8000" dirty="0">
                 <a:solidFill>
                   <a:schemeClr val="tx1"/>
                 </a:solidFill>
-                <a:latin typeface="+mj-lt"/>
-                <a:ea typeface="+mj-ea"/>
-                <a:cs typeface="+mj-cs"/>
               </a:rPr>
-              <a:t>Évax</a:t>
-            </a:r>
-            <a:r>
-              <a:rPr lang="fr-FR" sz="7200" dirty="0">
-                <a:solidFill>
-                  <a:schemeClr val="tx1"/>
-                </a:solidFill>
-                <a:latin typeface="+mj-lt"/>
-                <a:ea typeface="+mj-ea"/>
-                <a:cs typeface="+mj-cs"/>
-              </a:rPr>
-              <a:t> pygmée</a:t>
+              <a:t>Euphorbe des garrigues</a:t>
             </a:r>
           </a:p>
         </p:txBody>
@@ -5748,6 +8826,14 @@
             </a:lvl1pPr>
           </a:lstStyle>
           <a:p>
+            <a:r>
+              <a:rPr lang="fr-FR" dirty="0"/>
+              <a:t>S </a:t>
+            </a:r>
+            <a:r>
+              <a:rPr lang="fr-FR" dirty="0" smtClean="0"/>
+              <a:t>0</a:t>
+            </a:r>
             <a:endParaRPr lang="fr-FR" dirty="0"/>
           </a:p>
         </p:txBody>
@@ -5800,7 +8886,7 @@
             </a:r>
             <a:r>
               <a:rPr lang="fr-FR" dirty="0" smtClean="0"/>
-              <a:t>3</a:t>
+              <a:t>4</a:t>
             </a:r>
             <a:endParaRPr lang="fr-FR" dirty="0"/>
           </a:p>
@@ -5816,8 +8902,8 @@
         </p:nvSpPr>
         <p:spPr>
           <a:xfrm>
-            <a:off x="5076056" y="4905164"/>
-            <a:ext cx="3528392" cy="1800200"/>
+            <a:off x="6228184" y="5877272"/>
+            <a:ext cx="2808312" cy="648072"/>
           </a:xfrm>
           <a:prstGeom prst="rect">
             <a:avLst/>
@@ -5845,51 +8931,8 @@
           </a:lstStyle>
           <a:p>
             <a:r>
-              <a:rPr lang="fr-FR" sz="6000" dirty="0" smtClean="0"/>
-              <a:t> -1 At </a:t>
-            </a:r>
-            <a:endParaRPr lang="fr-FR" sz="6000" dirty="0"/>
-          </a:p>
-        </p:txBody>
-      </p:sp>
-      <p:sp>
-        <p:nvSpPr>
-          <p:cNvPr id="8" name="Titre 1"/>
-          <p:cNvSpPr txBox="1">
-            <a:spLocks/>
-          </p:cNvSpPr>
-          <p:nvPr/>
-        </p:nvSpPr>
-        <p:spPr>
-          <a:xfrm>
-            <a:off x="7604720" y="413048"/>
-            <a:ext cx="1368152" cy="648072"/>
-          </a:xfrm>
-          <a:prstGeom prst="rect">
-            <a:avLst/>
-          </a:prstGeom>
-        </p:spPr>
-        <p:txBody>
-          <a:bodyPr vert="horz" lIns="91440" tIns="45720" rIns="91440" bIns="45720" rtlCol="0" anchor="ctr">
-            <a:noAutofit/>
-          </a:bodyPr>
-          <a:lstStyle>
-            <a:lvl1pPr algn="ctr">
-              <a:spcBef>
-                <a:spcPct val="0"/>
-              </a:spcBef>
-              <a:buNone/>
-              <a:defRPr sz="7200">
-                <a:latin typeface="+mj-lt"/>
-                <a:ea typeface="+mj-ea"/>
-                <a:cs typeface="+mj-cs"/>
-              </a:defRPr>
-            </a:lvl1pPr>
-          </a:lstStyle>
-          <a:p>
-            <a:r>
               <a:rPr lang="fr-FR" dirty="0" smtClean="0"/>
-              <a:t>-</a:t>
+              <a:t>- 1 PV </a:t>
             </a:r>
             <a:endParaRPr lang="fr-FR" dirty="0"/>
           </a:p>
@@ -5898,7 +8941,7 @@
     </p:spTree>
     <p:extLst>
       <p:ext uri="{BB962C8B-B14F-4D97-AF65-F5344CB8AC3E}">
-        <p14:creationId xmlns:p14="http://schemas.microsoft.com/office/powerpoint/2010/main" val="302146750"/>
+        <p14:creationId xmlns:p14="http://schemas.microsoft.com/office/powerpoint/2010/main" val="3930640153"/>
       </p:ext>
     </p:extLst>
   </p:cSld>
@@ -5940,7 +8983,7 @@
         </p:nvSpPr>
         <p:spPr>
           <a:xfrm>
-            <a:off x="0" y="0"/>
+            <a:off x="20751" y="0"/>
             <a:ext cx="9144000" cy="6858000"/>
           </a:xfrm>
           <a:prstGeom prst="rect">
@@ -6010,7 +9053,7 @@
           <a:p>
             <a:r>
               <a:rPr lang="fr-FR" sz="7200" dirty="0" smtClean="0"/>
-              <a:t>-</a:t>
+              <a:t>A 0</a:t>
             </a:r>
             <a:endParaRPr lang="fr-FR" sz="7200" dirty="0"/>
           </a:p>
@@ -6033,35 +9076,19 @@
           </a:xfrm>
         </p:spPr>
         <p:txBody>
-          <a:bodyPr vert="horz" lIns="91440" tIns="45720" rIns="91440" bIns="45720" rtlCol="0" anchor="ctr">
-            <a:noAutofit/>
+          <a:bodyPr>
+            <a:normAutofit fontScale="62500" lnSpcReduction="20000"/>
           </a:bodyPr>
           <a:lstStyle/>
           <a:p>
-            <a:pPr>
-              <a:spcBef>
-                <a:spcPct val="0"/>
-              </a:spcBef>
-            </a:pPr>
-            <a:r>
-              <a:rPr lang="fr-FR" sz="7200" dirty="0" smtClean="0">
+            <a:r>
+              <a:rPr lang="fr-FR" sz="8000" dirty="0">
                 <a:solidFill>
                   <a:schemeClr val="tx1"/>
                 </a:solidFill>
-                <a:latin typeface="+mj-lt"/>
-                <a:ea typeface="+mj-ea"/>
-                <a:cs typeface="+mj-cs"/>
               </a:rPr>
-              <a:t>Escargot</a:t>
-            </a:r>
-            <a:endParaRPr lang="fr-FR" sz="7200" dirty="0">
-              <a:solidFill>
-                <a:schemeClr val="tx1"/>
-              </a:solidFill>
-              <a:latin typeface="+mj-lt"/>
-              <a:ea typeface="+mj-ea"/>
-              <a:cs typeface="+mj-cs"/>
-            </a:endParaRPr>
+              <a:t>Euphorbe des garrigues</a:t>
+            </a:r>
           </a:p>
         </p:txBody>
       </p:sp>
@@ -6100,6 +9127,14 @@
             </a:lvl1pPr>
           </a:lstStyle>
           <a:p>
+            <a:r>
+              <a:rPr lang="fr-FR" dirty="0"/>
+              <a:t>S </a:t>
+            </a:r>
+            <a:r>
+              <a:rPr lang="fr-FR" dirty="0" smtClean="0"/>
+              <a:t>0</a:t>
+            </a:r>
             <a:endParaRPr lang="fr-FR" dirty="0"/>
           </a:p>
         </p:txBody>
@@ -6152,7 +9187,7 @@
             </a:r>
             <a:r>
               <a:rPr lang="fr-FR" dirty="0" smtClean="0"/>
-              <a:t>8</a:t>
+              <a:t>4</a:t>
             </a:r>
             <a:endParaRPr lang="fr-FR" dirty="0"/>
           </a:p>
@@ -6168,8 +9203,8 @@
         </p:nvSpPr>
         <p:spPr>
           <a:xfrm>
-            <a:off x="4572000" y="4905164"/>
-            <a:ext cx="4032448" cy="1800200"/>
+            <a:off x="6228184" y="5877272"/>
+            <a:ext cx="2808312" cy="648072"/>
           </a:xfrm>
           <a:prstGeom prst="rect">
             <a:avLst/>
@@ -6197,51 +9232,8 @@
           </a:lstStyle>
           <a:p>
             <a:r>
-              <a:rPr lang="fr-FR" sz="4800" dirty="0" smtClean="0"/>
-              <a:t> chaque action coût +1 </a:t>
-            </a:r>
-            <a:endParaRPr lang="fr-FR" sz="4800" dirty="0"/>
-          </a:p>
-        </p:txBody>
-      </p:sp>
-      <p:sp>
-        <p:nvSpPr>
-          <p:cNvPr id="8" name="Titre 1"/>
-          <p:cNvSpPr txBox="1">
-            <a:spLocks/>
-          </p:cNvSpPr>
-          <p:nvPr/>
-        </p:nvSpPr>
-        <p:spPr>
-          <a:xfrm>
-            <a:off x="7604720" y="413048"/>
-            <a:ext cx="1368152" cy="648072"/>
-          </a:xfrm>
-          <a:prstGeom prst="rect">
-            <a:avLst/>
-          </a:prstGeom>
-        </p:spPr>
-        <p:txBody>
-          <a:bodyPr vert="horz" lIns="91440" tIns="45720" rIns="91440" bIns="45720" rtlCol="0" anchor="ctr">
-            <a:noAutofit/>
-          </a:bodyPr>
-          <a:lstStyle>
-            <a:lvl1pPr algn="ctr">
-              <a:spcBef>
-                <a:spcPct val="0"/>
-              </a:spcBef>
-              <a:buNone/>
-              <a:defRPr sz="7200">
-                <a:latin typeface="+mj-lt"/>
-                <a:ea typeface="+mj-ea"/>
-                <a:cs typeface="+mj-cs"/>
-              </a:defRPr>
-            </a:lvl1pPr>
-          </a:lstStyle>
-          <a:p>
-            <a:r>
               <a:rPr lang="fr-FR" dirty="0" smtClean="0"/>
-              <a:t>-</a:t>
+              <a:t>- 1 PV </a:t>
             </a:r>
             <a:endParaRPr lang="fr-FR" dirty="0"/>
           </a:p>
@@ -6250,7 +9242,7 @@
     </p:spTree>
     <p:extLst>
       <p:ext uri="{BB962C8B-B14F-4D97-AF65-F5344CB8AC3E}">
-        <p14:creationId xmlns:p14="http://schemas.microsoft.com/office/powerpoint/2010/main" val="3234651271"/>
+        <p14:creationId xmlns:p14="http://schemas.microsoft.com/office/powerpoint/2010/main" val="570601236"/>
       </p:ext>
     </p:extLst>
   </p:cSld>

</xml_diff>